<commit_message>
Final pres in pptx
</commit_message>
<xml_diff>
--- a/Final Project Presentation.pptx
+++ b/Final Project Presentation.pptx
@@ -17,6 +17,10 @@
     <p:sldId id="262" r:id="rId12"/>
     <p:sldId id="263" r:id="rId13"/>
     <p:sldId id="264" r:id="rId14"/>
+    <p:sldId id="265" r:id="rId15"/>
+    <p:sldId id="266" r:id="rId16"/>
+    <p:sldId id="267" r:id="rId17"/>
+    <p:sldId id="268" r:id="rId18"/>
   </p:sldIdLst>
   <p:sldSz cx="12192000" cy="6858000"/>
   <p:notesSz cx="7772400" cy="10058400"/>
@@ -6011,7 +6015,7 @@
               <a:buChar char=""/>
             </a:pPr>
             <a:r>
-              <a:rPr b="0" lang="en-US" sz="1800" spc="-1" strike="noStrike">
+              <a:rPr b="0" lang="en-US" sz="3200" spc="-1" strike="noStrike">
                 <a:solidFill>
                   <a:srgbClr val="000000"/>
                 </a:solidFill>
@@ -6024,7 +6028,7 @@
               </a:rPr>
               <a:t>Click to edit the outline text format</a:t>
             </a:r>
-            <a:endParaRPr b="0" lang="en-US" sz="1800" spc="-1" strike="noStrike">
+            <a:endParaRPr b="0" lang="en-US" sz="3200" spc="-1" strike="noStrike">
               <a:solidFill>
                 <a:srgbClr val="000000"/>
               </a:solidFill>
@@ -6046,7 +6050,7 @@
               <a:buChar char=""/>
             </a:pPr>
             <a:r>
-              <a:rPr b="0" lang="en-US" sz="1800" spc="-1" strike="noStrike">
+              <a:rPr b="0" lang="en-US" sz="2800" spc="-1" strike="noStrike">
                 <a:solidFill>
                   <a:srgbClr val="000000"/>
                 </a:solidFill>
@@ -6059,7 +6063,7 @@
               </a:rPr>
               <a:t>Second Outline Level</a:t>
             </a:r>
-            <a:endParaRPr b="0" lang="en-US" sz="1800" spc="-1" strike="noStrike">
+            <a:endParaRPr b="0" lang="en-US" sz="2800" spc="-1" strike="noStrike">
               <a:solidFill>
                 <a:srgbClr val="000000"/>
               </a:solidFill>
@@ -6081,7 +6085,7 @@
               <a:buChar char=""/>
             </a:pPr>
             <a:r>
-              <a:rPr b="0" lang="en-US" sz="1800" spc="-1" strike="noStrike">
+              <a:rPr b="0" lang="en-US" sz="2400" spc="-1" strike="noStrike">
                 <a:solidFill>
                   <a:srgbClr val="000000"/>
                 </a:solidFill>
@@ -6094,7 +6098,7 @@
               </a:rPr>
               <a:t>Third Outline Level</a:t>
             </a:r>
-            <a:endParaRPr b="0" lang="en-US" sz="1800" spc="-1" strike="noStrike">
+            <a:endParaRPr b="0" lang="en-US" sz="2400" spc="-1" strike="noStrike">
               <a:solidFill>
                 <a:srgbClr val="000000"/>
               </a:solidFill>
@@ -6116,7 +6120,7 @@
               <a:buChar char=""/>
             </a:pPr>
             <a:r>
-              <a:rPr b="0" lang="en-US" sz="1800" spc="-1" strike="noStrike">
+              <a:rPr b="0" lang="en-US" sz="2000" spc="-1" strike="noStrike">
                 <a:solidFill>
                   <a:srgbClr val="000000"/>
                 </a:solidFill>
@@ -6129,7 +6133,7 @@
               </a:rPr>
               <a:t>Fourth Outline Level</a:t>
             </a:r>
-            <a:endParaRPr b="0" lang="en-US" sz="1800" spc="-1" strike="noStrike">
+            <a:endParaRPr b="0" lang="en-US" sz="2000" spc="-1" strike="noStrike">
               <a:solidFill>
                 <a:srgbClr val="000000"/>
               </a:solidFill>
@@ -6151,7 +6155,7 @@
               <a:buChar char=""/>
             </a:pPr>
             <a:r>
-              <a:rPr b="0" lang="en-US" sz="1800" spc="-1" strike="noStrike">
+              <a:rPr b="0" lang="en-US" sz="2000" spc="-1" strike="noStrike">
                 <a:solidFill>
                   <a:srgbClr val="000000"/>
                 </a:solidFill>
@@ -6164,7 +6168,7 @@
               </a:rPr>
               <a:t>Fifth Outline Level</a:t>
             </a:r>
-            <a:endParaRPr b="0" lang="en-US" sz="1800" spc="-1" strike="noStrike">
+            <a:endParaRPr b="0" lang="en-US" sz="2000" spc="-1" strike="noStrike">
               <a:solidFill>
                 <a:srgbClr val="000000"/>
               </a:solidFill>
@@ -6186,7 +6190,7 @@
               <a:buChar char=""/>
             </a:pPr>
             <a:r>
-              <a:rPr b="0" lang="en-US" sz="1800" spc="-1" strike="noStrike">
+              <a:rPr b="0" lang="en-US" sz="2000" spc="-1" strike="noStrike">
                 <a:solidFill>
                   <a:srgbClr val="000000"/>
                 </a:solidFill>
@@ -6199,7 +6203,7 @@
               </a:rPr>
               <a:t>Sixth Outline Level</a:t>
             </a:r>
-            <a:endParaRPr b="0" lang="en-US" sz="1800" spc="-1" strike="noStrike">
+            <a:endParaRPr b="0" lang="en-US" sz="2000" spc="-1" strike="noStrike">
               <a:solidFill>
                 <a:srgbClr val="000000"/>
               </a:solidFill>
@@ -6221,7 +6225,7 @@
               <a:buChar char=""/>
             </a:pPr>
             <a:r>
-              <a:rPr b="0" lang="en-US" sz="1800" spc="-1" strike="noStrike">
+              <a:rPr b="0" lang="en-US" sz="2000" spc="-1" strike="noStrike">
                 <a:solidFill>
                   <a:srgbClr val="000000"/>
                 </a:solidFill>
@@ -6234,7 +6238,7 @@
               </a:rPr>
               <a:t>Seventh Outline Level</a:t>
             </a:r>
-            <a:endParaRPr b="0" lang="en-US" sz="1800" spc="-1" strike="noStrike">
+            <a:endParaRPr b="0" lang="en-US" sz="2000" spc="-1" strike="noStrike">
               <a:solidFill>
                 <a:srgbClr val="000000"/>
               </a:solidFill>
@@ -7086,7 +7090,7 @@
               <a:buChar char=""/>
             </a:pPr>
             <a:r>
-              <a:rPr b="0" lang="en-US" sz="1800" spc="-1" strike="noStrike">
+              <a:rPr b="0" lang="en-US" sz="3200" spc="-1" strike="noStrike">
                 <a:solidFill>
                   <a:srgbClr val="000000"/>
                 </a:solidFill>
@@ -7099,7 +7103,7 @@
               </a:rPr>
               <a:t>Click to edit the outline text format</a:t>
             </a:r>
-            <a:endParaRPr b="0" lang="en-US" sz="1800" spc="-1" strike="noStrike">
+            <a:endParaRPr b="0" lang="en-US" sz="3200" spc="-1" strike="noStrike">
               <a:solidFill>
                 <a:srgbClr val="000000"/>
               </a:solidFill>
@@ -7121,7 +7125,7 @@
               <a:buChar char=""/>
             </a:pPr>
             <a:r>
-              <a:rPr b="0" lang="en-US" sz="1800" spc="-1" strike="noStrike">
+              <a:rPr b="0" lang="en-US" sz="2800" spc="-1" strike="noStrike">
                 <a:solidFill>
                   <a:srgbClr val="000000"/>
                 </a:solidFill>
@@ -7134,7 +7138,7 @@
               </a:rPr>
               <a:t>Second Outline Level</a:t>
             </a:r>
-            <a:endParaRPr b="0" lang="en-US" sz="1800" spc="-1" strike="noStrike">
+            <a:endParaRPr b="0" lang="en-US" sz="2800" spc="-1" strike="noStrike">
               <a:solidFill>
                 <a:srgbClr val="000000"/>
               </a:solidFill>
@@ -7156,7 +7160,7 @@
               <a:buChar char=""/>
             </a:pPr>
             <a:r>
-              <a:rPr b="0" lang="en-US" sz="1800" spc="-1" strike="noStrike">
+              <a:rPr b="0" lang="en-US" sz="2400" spc="-1" strike="noStrike">
                 <a:solidFill>
                   <a:srgbClr val="000000"/>
                 </a:solidFill>
@@ -7169,7 +7173,7 @@
               </a:rPr>
               <a:t>Third Outline Level</a:t>
             </a:r>
-            <a:endParaRPr b="0" lang="en-US" sz="1800" spc="-1" strike="noStrike">
+            <a:endParaRPr b="0" lang="en-US" sz="2400" spc="-1" strike="noStrike">
               <a:solidFill>
                 <a:srgbClr val="000000"/>
               </a:solidFill>
@@ -7191,7 +7195,7 @@
               <a:buChar char=""/>
             </a:pPr>
             <a:r>
-              <a:rPr b="0" lang="en-US" sz="1800" spc="-1" strike="noStrike">
+              <a:rPr b="0" lang="en-US" sz="2000" spc="-1" strike="noStrike">
                 <a:solidFill>
                   <a:srgbClr val="000000"/>
                 </a:solidFill>
@@ -7204,7 +7208,7 @@
               </a:rPr>
               <a:t>Fourth Outline Level</a:t>
             </a:r>
-            <a:endParaRPr b="0" lang="en-US" sz="1800" spc="-1" strike="noStrike">
+            <a:endParaRPr b="0" lang="en-US" sz="2000" spc="-1" strike="noStrike">
               <a:solidFill>
                 <a:srgbClr val="000000"/>
               </a:solidFill>
@@ -7226,7 +7230,7 @@
               <a:buChar char=""/>
             </a:pPr>
             <a:r>
-              <a:rPr b="0" lang="en-US" sz="1800" spc="-1" strike="noStrike">
+              <a:rPr b="0" lang="en-US" sz="2000" spc="-1" strike="noStrike">
                 <a:solidFill>
                   <a:srgbClr val="000000"/>
                 </a:solidFill>
@@ -7239,7 +7243,7 @@
               </a:rPr>
               <a:t>Fifth Outline Level</a:t>
             </a:r>
-            <a:endParaRPr b="0" lang="en-US" sz="1800" spc="-1" strike="noStrike">
+            <a:endParaRPr b="0" lang="en-US" sz="2000" spc="-1" strike="noStrike">
               <a:solidFill>
                 <a:srgbClr val="000000"/>
               </a:solidFill>
@@ -7261,7 +7265,7 @@
               <a:buChar char=""/>
             </a:pPr>
             <a:r>
-              <a:rPr b="0" lang="en-US" sz="1800" spc="-1" strike="noStrike">
+              <a:rPr b="0" lang="en-US" sz="2000" spc="-1" strike="noStrike">
                 <a:solidFill>
                   <a:srgbClr val="000000"/>
                 </a:solidFill>
@@ -7274,7 +7278,7 @@
               </a:rPr>
               <a:t>Sixth Outline Level</a:t>
             </a:r>
-            <a:endParaRPr b="0" lang="en-US" sz="1800" spc="-1" strike="noStrike">
+            <a:endParaRPr b="0" lang="en-US" sz="2000" spc="-1" strike="noStrike">
               <a:solidFill>
                 <a:srgbClr val="000000"/>
               </a:solidFill>
@@ -7296,7 +7300,7 @@
               <a:buChar char=""/>
             </a:pPr>
             <a:r>
-              <a:rPr b="0" lang="en-US" sz="1800" spc="-1" strike="noStrike">
+              <a:rPr b="0" lang="en-US" sz="2000" spc="-1" strike="noStrike">
                 <a:solidFill>
                   <a:srgbClr val="000000"/>
                 </a:solidFill>
@@ -7309,7 +7313,7 @@
               </a:rPr>
               <a:t>Seventh Outline Level</a:t>
             </a:r>
-            <a:endParaRPr b="0" lang="en-US" sz="1800" spc="-1" strike="noStrike">
+            <a:endParaRPr b="0" lang="en-US" sz="2000" spc="-1" strike="noStrike">
               <a:solidFill>
                 <a:srgbClr val="000000"/>
               </a:solidFill>
@@ -7486,33 +7490,441 @@
       </p:sp>
     </p:spTree>
   </p:cSld>
-  <p:timing>
-    <p:tnLst>
-      <p:par>
-        <p:cTn id="1" dur="indefinite" restart="never" nodeType="tmRoot">
-          <p:childTnLst>
-            <p:seq>
-              <p:cTn id="2" nodeType="mainSeq"/>
-              <p:prevCondLst>
-                <p:cond delay="0" evt="onPrev">
-                  <p:tgtEl>
-                    <p:sldTgt/>
-                  </p:tgtEl>
-                </p:cond>
-              </p:prevCondLst>
-              <p:nextCondLst>
-                <p:cond delay="0" evt="onNext">
-                  <p:tgtEl>
-                    <p:sldTgt/>
-                  </p:tgtEl>
-                </p:cond>
-              </p:nextCondLst>
-            </p:seq>
-          </p:childTnLst>
-        </p:cTn>
-      </p:par>
-    </p:tnLst>
-  </p:timing>
+</p:sld>
+</file>
+
+<file path=ppt/slides/slide10.xml><?xml version="1.0" encoding="utf-8"?>
+<p:sld xmlns:a="http://schemas.openxmlformats.org/drawingml/2006/main" xmlns:p="http://schemas.openxmlformats.org/presentationml/2006/main" xmlns:r="http://schemas.openxmlformats.org/officeDocument/2006/relationships" xmlns:p14="http://schemas.microsoft.com/office/powerpoint/2010/main" xmlns:p15="http://schemas.microsoft.com/office/powerpoint/2012/main" xmlns:mc="http://schemas.openxmlformats.org/markup-compatibility/2006">
+  <p:cSld>
+    <p:spTree>
+      <p:nvGrpSpPr>
+        <p:cNvPr id="1" name=""/>
+        <p:cNvGrpSpPr/>
+        <p:nvPr/>
+      </p:nvGrpSpPr>
+      <p:grpSpPr>
+        <a:xfrm>
+          <a:off x="0" y="0"/>
+          <a:ext cx="0" cy="0"/>
+          <a:chOff x="0" y="0"/>
+          <a:chExt cx="0" cy="0"/>
+        </a:xfrm>
+      </p:grpSpPr>
+      <p:sp>
+        <p:nvSpPr>
+          <p:cNvPr id="162" name="CustomShape 1"/>
+          <p:cNvSpPr/>
+          <p:nvPr/>
+        </p:nvSpPr>
+        <p:spPr>
+          <a:xfrm>
+            <a:off x="838080" y="48960"/>
+            <a:ext cx="10514520" cy="1956960"/>
+          </a:xfrm>
+          <a:prstGeom prst="rect">
+            <a:avLst/>
+          </a:prstGeom>
+          <a:noFill/>
+          <a:ln>
+            <a:noFill/>
+          </a:ln>
+        </p:spPr>
+        <p:style>
+          <a:lnRef idx="0"/>
+          <a:fillRef idx="0"/>
+          <a:effectRef idx="0"/>
+          <a:fontRef idx="minor"/>
+        </p:style>
+        <p:txBody>
+          <a:bodyPr lIns="0" rIns="0" tIns="0" bIns="0" anchor="ctr"/>
+          <a:p>
+            <a:r>
+              <a:rPr b="0" lang="en-US" sz="4400" spc="-1" strike="noStrike">
+                <a:solidFill>
+                  <a:srgbClr val="000000"/>
+                </a:solidFill>
+                <a:uFill>
+                  <a:solidFill>
+                    <a:srgbClr val="ffffff"/>
+                  </a:solidFill>
+                </a:uFill>
+                <a:latin typeface="Andalus"/>
+                <a:ea typeface="DejaVu Sans"/>
+              </a:rPr>
+              <a:t>Results</a:t>
+            </a:r>
+            <a:endParaRPr b="0" lang="en-US" sz="1800" spc="-1" strike="noStrike">
+              <a:solidFill>
+                <a:srgbClr val="000000"/>
+              </a:solidFill>
+              <a:uFill>
+                <a:solidFill>
+                  <a:srgbClr val="ffffff"/>
+                </a:solidFill>
+              </a:uFill>
+              <a:latin typeface="Arial"/>
+            </a:endParaRPr>
+          </a:p>
+        </p:txBody>
+      </p:sp>
+      <p:sp>
+        <p:nvSpPr>
+          <p:cNvPr id="163" name="CustomShape 2"/>
+          <p:cNvSpPr/>
+          <p:nvPr/>
+        </p:nvSpPr>
+        <p:spPr>
+          <a:xfrm>
+            <a:off x="640440" y="2057760"/>
+            <a:ext cx="10972080" cy="3976920"/>
+          </a:xfrm>
+          <a:prstGeom prst="rect">
+            <a:avLst/>
+          </a:prstGeom>
+          <a:noFill/>
+          <a:ln>
+            <a:noFill/>
+          </a:ln>
+        </p:spPr>
+        <p:style>
+          <a:lnRef idx="0"/>
+          <a:fillRef idx="0"/>
+          <a:effectRef idx="0"/>
+          <a:fontRef idx="minor"/>
+        </p:style>
+      </p:sp>
+      <p:pic>
+        <p:nvPicPr>
+          <p:cNvPr id="164" name="" descr=""/>
+          <p:cNvPicPr/>
+          <p:nvPr/>
+        </p:nvPicPr>
+        <p:blipFill>
+          <a:blip r:embed="rId1"/>
+          <a:stretch/>
+        </p:blipFill>
+        <p:spPr>
+          <a:xfrm>
+            <a:off x="2162520" y="1469520"/>
+            <a:ext cx="7219440" cy="4819320"/>
+          </a:xfrm>
+          <a:prstGeom prst="rect">
+            <a:avLst/>
+          </a:prstGeom>
+          <a:ln>
+            <a:noFill/>
+          </a:ln>
+        </p:spPr>
+      </p:pic>
+    </p:spTree>
+  </p:cSld>
+</p:sld>
+</file>
+
+<file path=ppt/slides/slide11.xml><?xml version="1.0" encoding="utf-8"?>
+<p:sld xmlns:a="http://schemas.openxmlformats.org/drawingml/2006/main" xmlns:p="http://schemas.openxmlformats.org/presentationml/2006/main" xmlns:r="http://schemas.openxmlformats.org/officeDocument/2006/relationships" xmlns:p14="http://schemas.microsoft.com/office/powerpoint/2010/main" xmlns:p15="http://schemas.microsoft.com/office/powerpoint/2012/main" xmlns:mc="http://schemas.openxmlformats.org/markup-compatibility/2006">
+  <p:cSld>
+    <p:spTree>
+      <p:nvGrpSpPr>
+        <p:cNvPr id="1" name=""/>
+        <p:cNvGrpSpPr/>
+        <p:nvPr/>
+      </p:nvGrpSpPr>
+      <p:grpSpPr>
+        <a:xfrm>
+          <a:off x="0" y="0"/>
+          <a:ext cx="0" cy="0"/>
+          <a:chOff x="0" y="0"/>
+          <a:chExt cx="0" cy="0"/>
+        </a:xfrm>
+      </p:grpSpPr>
+      <p:sp>
+        <p:nvSpPr>
+          <p:cNvPr id="165" name="CustomShape 1"/>
+          <p:cNvSpPr/>
+          <p:nvPr/>
+        </p:nvSpPr>
+        <p:spPr>
+          <a:xfrm>
+            <a:off x="838080" y="48960"/>
+            <a:ext cx="10514520" cy="1956960"/>
+          </a:xfrm>
+          <a:prstGeom prst="rect">
+            <a:avLst/>
+          </a:prstGeom>
+          <a:noFill/>
+          <a:ln>
+            <a:noFill/>
+          </a:ln>
+        </p:spPr>
+        <p:style>
+          <a:lnRef idx="0"/>
+          <a:fillRef idx="0"/>
+          <a:effectRef idx="0"/>
+          <a:fontRef idx="minor"/>
+        </p:style>
+        <p:txBody>
+          <a:bodyPr lIns="0" rIns="0" tIns="0" bIns="0" anchor="ctr"/>
+          <a:p>
+            <a:r>
+              <a:rPr b="0" lang="en-US" sz="4400" spc="-1" strike="noStrike">
+                <a:solidFill>
+                  <a:srgbClr val="000000"/>
+                </a:solidFill>
+                <a:uFill>
+                  <a:solidFill>
+                    <a:srgbClr val="ffffff"/>
+                  </a:solidFill>
+                </a:uFill>
+                <a:latin typeface="Andalus"/>
+                <a:ea typeface="DejaVu Sans"/>
+              </a:rPr>
+              <a:t>Results</a:t>
+            </a:r>
+            <a:endParaRPr b="0" lang="en-US" sz="1800" spc="-1" strike="noStrike">
+              <a:solidFill>
+                <a:srgbClr val="000000"/>
+              </a:solidFill>
+              <a:uFill>
+                <a:solidFill>
+                  <a:srgbClr val="ffffff"/>
+                </a:solidFill>
+              </a:uFill>
+              <a:latin typeface="Arial"/>
+            </a:endParaRPr>
+          </a:p>
+        </p:txBody>
+      </p:sp>
+      <p:sp>
+        <p:nvSpPr>
+          <p:cNvPr id="166" name="CustomShape 2"/>
+          <p:cNvSpPr/>
+          <p:nvPr/>
+        </p:nvSpPr>
+        <p:spPr>
+          <a:xfrm>
+            <a:off x="640440" y="2057760"/>
+            <a:ext cx="10972080" cy="3976920"/>
+          </a:xfrm>
+          <a:prstGeom prst="rect">
+            <a:avLst/>
+          </a:prstGeom>
+          <a:noFill/>
+          <a:ln>
+            <a:noFill/>
+          </a:ln>
+        </p:spPr>
+        <p:style>
+          <a:lnRef idx="0"/>
+          <a:fillRef idx="0"/>
+          <a:effectRef idx="0"/>
+          <a:fontRef idx="minor"/>
+        </p:style>
+      </p:sp>
+      <p:pic>
+        <p:nvPicPr>
+          <p:cNvPr id="167" name="" descr=""/>
+          <p:cNvPicPr/>
+          <p:nvPr/>
+        </p:nvPicPr>
+        <p:blipFill>
+          <a:blip r:embed="rId1"/>
+          <a:stretch/>
+        </p:blipFill>
+        <p:spPr>
+          <a:xfrm>
+            <a:off x="3104280" y="1080000"/>
+            <a:ext cx="7495920" cy="5238360"/>
+          </a:xfrm>
+          <a:prstGeom prst="rect">
+            <a:avLst/>
+          </a:prstGeom>
+          <a:ln>
+            <a:noFill/>
+          </a:ln>
+        </p:spPr>
+      </p:pic>
+    </p:spTree>
+  </p:cSld>
+</p:sld>
+</file>
+
+<file path=ppt/slides/slide12.xml><?xml version="1.0" encoding="utf-8"?>
+<p:sld xmlns:a="http://schemas.openxmlformats.org/drawingml/2006/main" xmlns:p="http://schemas.openxmlformats.org/presentationml/2006/main" xmlns:r="http://schemas.openxmlformats.org/officeDocument/2006/relationships" xmlns:p14="http://schemas.microsoft.com/office/powerpoint/2010/main" xmlns:p15="http://schemas.microsoft.com/office/powerpoint/2012/main" xmlns:mc="http://schemas.openxmlformats.org/markup-compatibility/2006">
+  <p:cSld>
+    <p:spTree>
+      <p:nvGrpSpPr>
+        <p:cNvPr id="1" name=""/>
+        <p:cNvGrpSpPr/>
+        <p:nvPr/>
+      </p:nvGrpSpPr>
+      <p:grpSpPr>
+        <a:xfrm>
+          <a:off x="0" y="0"/>
+          <a:ext cx="0" cy="0"/>
+          <a:chOff x="0" y="0"/>
+          <a:chExt cx="0" cy="0"/>
+        </a:xfrm>
+      </p:grpSpPr>
+      <p:sp>
+        <p:nvSpPr>
+          <p:cNvPr id="168" name="CustomShape 1"/>
+          <p:cNvSpPr/>
+          <p:nvPr/>
+        </p:nvSpPr>
+        <p:spPr>
+          <a:xfrm>
+            <a:off x="838080" y="365040"/>
+            <a:ext cx="10514520" cy="1324440"/>
+          </a:xfrm>
+          <a:prstGeom prst="rect">
+            <a:avLst/>
+          </a:prstGeom>
+          <a:noFill/>
+          <a:ln>
+            <a:noFill/>
+          </a:ln>
+        </p:spPr>
+        <p:style>
+          <a:lnRef idx="0"/>
+          <a:fillRef idx="0"/>
+          <a:effectRef idx="0"/>
+          <a:fontRef idx="minor"/>
+        </p:style>
+        <p:txBody>
+          <a:bodyPr lIns="0" rIns="0" tIns="0" bIns="0" anchor="ctr"/>
+          <a:p>
+            <a:r>
+              <a:rPr b="0" lang="en-US" sz="4400" spc="-1" strike="noStrike">
+                <a:solidFill>
+                  <a:srgbClr val="000000"/>
+                </a:solidFill>
+                <a:uFill>
+                  <a:solidFill>
+                    <a:srgbClr val="ffffff"/>
+                  </a:solidFill>
+                </a:uFill>
+                <a:latin typeface="Andalus"/>
+                <a:ea typeface="DejaVu Sans"/>
+              </a:rPr>
+              <a:t>Extra Video with max number of cars system can handle</a:t>
+            </a:r>
+            <a:endParaRPr b="0" lang="en-US" sz="1800" spc="-1" strike="noStrike">
+              <a:solidFill>
+                <a:srgbClr val="000000"/>
+              </a:solidFill>
+              <a:uFill>
+                <a:solidFill>
+                  <a:srgbClr val="ffffff"/>
+                </a:solidFill>
+              </a:uFill>
+              <a:latin typeface="Arial"/>
+            </a:endParaRPr>
+          </a:p>
+        </p:txBody>
+      </p:sp>
+      <p:sp>
+        <p:nvSpPr>
+          <p:cNvPr id="169" name="CustomShape 2"/>
+          <p:cNvSpPr/>
+          <p:nvPr/>
+        </p:nvSpPr>
+        <p:spPr>
+          <a:xfrm>
+            <a:off x="609480" y="1604520"/>
+            <a:ext cx="10972080" cy="3976920"/>
+          </a:xfrm>
+          <a:prstGeom prst="rect">
+            <a:avLst/>
+          </a:prstGeom>
+          <a:noFill/>
+          <a:ln>
+            <a:noFill/>
+          </a:ln>
+        </p:spPr>
+        <p:style>
+          <a:lnRef idx="0"/>
+          <a:fillRef idx="0"/>
+          <a:effectRef idx="0"/>
+          <a:fontRef idx="minor"/>
+        </p:style>
+      </p:sp>
+    </p:spTree>
+  </p:cSld>
+</p:sld>
+</file>
+
+<file path=ppt/slides/slide13.xml><?xml version="1.0" encoding="utf-8"?>
+<p:sld xmlns:a="http://schemas.openxmlformats.org/drawingml/2006/main" xmlns:p="http://schemas.openxmlformats.org/presentationml/2006/main" xmlns:r="http://schemas.openxmlformats.org/officeDocument/2006/relationships" xmlns:p14="http://schemas.microsoft.com/office/powerpoint/2010/main" xmlns:p15="http://schemas.microsoft.com/office/powerpoint/2012/main" xmlns:mc="http://schemas.openxmlformats.org/markup-compatibility/2006">
+  <p:cSld>
+    <p:spTree>
+      <p:nvGrpSpPr>
+        <p:cNvPr id="1" name=""/>
+        <p:cNvGrpSpPr/>
+        <p:nvPr/>
+      </p:nvGrpSpPr>
+      <p:grpSpPr>
+        <a:xfrm>
+          <a:off x="0" y="0"/>
+          <a:ext cx="0" cy="0"/>
+          <a:chOff x="0" y="0"/>
+          <a:chExt cx="0" cy="0"/>
+        </a:xfrm>
+      </p:grpSpPr>
+      <p:sp>
+        <p:nvSpPr>
+          <p:cNvPr id="170" name="TextShape 1"/>
+          <p:cNvSpPr txBox="1"/>
+          <p:nvPr/>
+        </p:nvSpPr>
+        <p:spPr>
+          <a:xfrm>
+            <a:off x="838080" y="365040"/>
+            <a:ext cx="10514520" cy="1324440"/>
+          </a:xfrm>
+          <a:prstGeom prst="rect">
+            <a:avLst/>
+          </a:prstGeom>
+          <a:noFill/>
+          <a:ln>
+            <a:noFill/>
+          </a:ln>
+        </p:spPr>
+        <p:txBody>
+          <a:bodyPr lIns="0" rIns="0" tIns="0" bIns="0" anchor="ctr"/>
+          <a:p>
+            <a:pPr algn="ctr"/>
+            <a:r>
+              <a:rPr b="0" lang="en-US" sz="4400" spc="-1" strike="noStrike">
+                <a:solidFill>
+                  <a:srgbClr val="000000"/>
+                </a:solidFill>
+                <a:uFill>
+                  <a:solidFill>
+                    <a:srgbClr val="ffffff"/>
+                  </a:solidFill>
+                </a:uFill>
+                <a:latin typeface="Andalus"/>
+                <a:ea typeface="DejaVu Sans"/>
+              </a:rPr>
+              <a:t>Extra Video with Teslas (Not Accurate)</a:t>
+            </a:r>
+            <a:endParaRPr b="0" lang="en-US" sz="4400" spc="-1" strike="noStrike">
+              <a:solidFill>
+                <a:srgbClr val="000000"/>
+              </a:solidFill>
+              <a:uFill>
+                <a:solidFill>
+                  <a:srgbClr val="ffffff"/>
+                </a:solidFill>
+              </a:uFill>
+              <a:latin typeface="Arial"/>
+            </a:endParaRPr>
+          </a:p>
+        </p:txBody>
+      </p:sp>
+    </p:spTree>
+  </p:cSld>
 </p:sld>
 </file>
 
@@ -7579,7 +7991,7 @@
                 <a:latin typeface="Andalus"/>
                 <a:ea typeface="DejaVu Sans"/>
               </a:rPr>
-              <a:t>Project Scope &amp; Recap</a:t>
+              <a:t>Project Scope &amp; Completion</a:t>
             </a:r>
             <a:endParaRPr b="0" lang="en-US" sz="1800" spc="-1" strike="noStrike">
               <a:solidFill>
@@ -7910,33 +8322,6 @@
       </p:sp>
     </p:spTree>
   </p:cSld>
-  <p:timing>
-    <p:tnLst>
-      <p:par>
-        <p:cTn id="3" dur="indefinite" restart="never" nodeType="tmRoot">
-          <p:childTnLst>
-            <p:seq>
-              <p:cTn id="4" nodeType="mainSeq"/>
-              <p:prevCondLst>
-                <p:cond delay="0" evt="onPrev">
-                  <p:tgtEl>
-                    <p:sldTgt/>
-                  </p:tgtEl>
-                </p:cond>
-              </p:prevCondLst>
-              <p:nextCondLst>
-                <p:cond delay="0" evt="onNext">
-                  <p:tgtEl>
-                    <p:sldTgt/>
-                  </p:tgtEl>
-                </p:cond>
-              </p:nextCondLst>
-            </p:seq>
-          </p:childTnLst>
-        </p:cTn>
-      </p:par>
-    </p:tnLst>
-  </p:timing>
 </p:sld>
 </file>
 
@@ -8003,7 +8388,7 @@
                 <a:latin typeface="Andalus"/>
                 <a:ea typeface="DejaVu Sans"/>
               </a:rPr>
-              <a:t>Video for Policy 0 with pan and zoom</a:t>
+              <a:t>Our Policy</a:t>
             </a:r>
             <a:endParaRPr b="0" lang="en-US" sz="1800" spc="-1" strike="noStrike">
               <a:solidFill>
@@ -8021,33 +8406,6 @@
       </p:sp>
     </p:spTree>
   </p:cSld>
-  <p:timing>
-    <p:tnLst>
-      <p:par>
-        <p:cTn id="5" dur="indefinite" restart="never" nodeType="tmRoot">
-          <p:childTnLst>
-            <p:seq>
-              <p:cTn id="6" nodeType="mainSeq"/>
-              <p:prevCondLst>
-                <p:cond delay="0" evt="onPrev">
-                  <p:tgtEl>
-                    <p:sldTgt/>
-                  </p:tgtEl>
-                </p:cond>
-              </p:prevCondLst>
-              <p:nextCondLst>
-                <p:cond delay="0" evt="onNext">
-                  <p:tgtEl>
-                    <p:sldTgt/>
-                  </p:tgtEl>
-                </p:cond>
-              </p:nextCondLst>
-            </p:seq>
-          </p:childTnLst>
-        </p:cTn>
-      </p:par>
-    </p:tnLst>
-  </p:timing>
 </p:sld>
 </file>
 
@@ -8076,8 +8434,8 @@
         </p:nvSpPr>
         <p:spPr>
           <a:xfrm>
-            <a:off x="284040" y="262800"/>
-            <a:ext cx="6482160" cy="1329120"/>
+            <a:off x="516600" y="0"/>
+            <a:ext cx="10514520" cy="1324440"/>
           </a:xfrm>
           <a:prstGeom prst="rect">
             <a:avLst/>
@@ -8094,7 +8452,7 @@
           <a:fontRef idx="minor"/>
         </p:style>
         <p:txBody>
-          <a:bodyPr lIns="90000" rIns="90000" tIns="45000" bIns="45000"/>
+          <a:bodyPr lIns="0" rIns="0" tIns="0" bIns="0" anchor="ctr"/>
           <a:p>
             <a:pPr>
               <a:lnSpc>
@@ -8114,7 +8472,7 @@
                 <a:latin typeface="Andalus"/>
                 <a:ea typeface="DejaVu Sans"/>
               </a:rPr>
-              <a:t>Video with all policies running side by side</a:t>
+              <a:t>Challenges &amp; Time Crunch</a:t>
             </a:r>
             <a:endParaRPr b="0" lang="en-US" sz="1800" spc="-1" strike="noStrike">
               <a:solidFill>
@@ -8130,35 +8488,308 @@
           </a:p>
         </p:txBody>
       </p:sp>
+      <p:sp>
+        <p:nvSpPr>
+          <p:cNvPr id="150" name="CustomShape 2"/>
+          <p:cNvSpPr/>
+          <p:nvPr/>
+        </p:nvSpPr>
+        <p:spPr>
+          <a:xfrm>
+            <a:off x="455760" y="1496880"/>
+            <a:ext cx="10506600" cy="516600"/>
+          </a:xfrm>
+          <a:prstGeom prst="rect">
+            <a:avLst/>
+          </a:prstGeom>
+          <a:noFill/>
+          <a:ln>
+            <a:noFill/>
+          </a:ln>
+        </p:spPr>
+        <p:style>
+          <a:lnRef idx="0"/>
+          <a:fillRef idx="0"/>
+          <a:effectRef idx="0"/>
+          <a:fontRef idx="minor"/>
+        </p:style>
+        <p:txBody>
+          <a:bodyPr lIns="90000" rIns="90000" tIns="45000" bIns="45000"/>
+          <a:p>
+            <a:pPr marL="285840" indent="-285120">
+              <a:lnSpc>
+                <a:spcPct val="100000"/>
+              </a:lnSpc>
+              <a:buClr>
+                <a:srgbClr val="000000"/>
+              </a:buClr>
+              <a:buFont typeface="Arial"/>
+              <a:buChar char="•"/>
+            </a:pPr>
+            <a:r>
+              <a:rPr b="0" lang="en-US" sz="2800" spc="-1" strike="noStrike">
+                <a:solidFill>
+                  <a:srgbClr val="000000"/>
+                </a:solidFill>
+                <a:uFill>
+                  <a:solidFill>
+                    <a:srgbClr val="ffffff"/>
+                  </a:solidFill>
+                </a:uFill>
+                <a:latin typeface="Calibri"/>
+                <a:ea typeface="DejaVu Sans"/>
+              </a:rPr>
+              <a:t>Developing a stress testing technique (on hold)</a:t>
+            </a:r>
+            <a:endParaRPr b="0" lang="en-US" sz="1800" spc="-1" strike="noStrike">
+              <a:solidFill>
+                <a:srgbClr val="000000"/>
+              </a:solidFill>
+              <a:uFill>
+                <a:solidFill>
+                  <a:srgbClr val="ffffff"/>
+                </a:solidFill>
+              </a:uFill>
+              <a:latin typeface="Arial"/>
+            </a:endParaRPr>
+          </a:p>
+          <a:p>
+            <a:pPr marL="228600" indent="-227520">
+              <a:lnSpc>
+                <a:spcPct val="90000"/>
+              </a:lnSpc>
+              <a:buClr>
+                <a:srgbClr val="000000"/>
+              </a:buClr>
+              <a:buFont typeface="Arial"/>
+              <a:buChar char="•"/>
+            </a:pPr>
+            <a:r>
+              <a:rPr b="0" lang="en-US" sz="2800" spc="-1" strike="noStrike">
+                <a:solidFill>
+                  <a:srgbClr val="000000"/>
+                </a:solidFill>
+                <a:uFill>
+                  <a:solidFill>
+                    <a:srgbClr val="ffffff"/>
+                  </a:solidFill>
+                </a:uFill>
+                <a:latin typeface="Calibri"/>
+                <a:ea typeface="DejaVu Sans"/>
+              </a:rPr>
+              <a:t>This will be what we added/updated:</a:t>
+            </a:r>
+            <a:endParaRPr b="0" lang="en-US" sz="1800" spc="-1" strike="noStrike">
+              <a:solidFill>
+                <a:srgbClr val="000000"/>
+              </a:solidFill>
+              <a:uFill>
+                <a:solidFill>
+                  <a:srgbClr val="ffffff"/>
+                </a:solidFill>
+              </a:uFill>
+              <a:latin typeface="Arial"/>
+            </a:endParaRPr>
+          </a:p>
+          <a:p>
+            <a:pPr lvl="1" marL="432000" indent="-216000">
+              <a:lnSpc>
+                <a:spcPct val="90000"/>
+              </a:lnSpc>
+              <a:buClr>
+                <a:srgbClr val="000000"/>
+              </a:buClr>
+              <a:buSzPct val="45000"/>
+              <a:buFont typeface="Wingdings" charset="2"/>
+              <a:buChar char=""/>
+            </a:pPr>
+            <a:r>
+              <a:rPr b="0" lang="en-US" sz="2800" spc="-1" strike="noStrike">
+                <a:solidFill>
+                  <a:srgbClr val="000000"/>
+                </a:solidFill>
+                <a:uFill>
+                  <a:solidFill>
+                    <a:srgbClr val="ffffff"/>
+                  </a:solidFill>
+                </a:uFill>
+                <a:latin typeface="Calibri"/>
+                <a:ea typeface="DejaVu Sans"/>
+              </a:rPr>
+              <a:t>ACC</a:t>
+            </a:r>
+            <a:endParaRPr b="0" lang="en-US" sz="1800" spc="-1" strike="noStrike">
+              <a:solidFill>
+                <a:srgbClr val="000000"/>
+              </a:solidFill>
+              <a:uFill>
+                <a:solidFill>
+                  <a:srgbClr val="ffffff"/>
+                </a:solidFill>
+              </a:uFill>
+              <a:latin typeface="Arial"/>
+            </a:endParaRPr>
+          </a:p>
+          <a:p>
+            <a:pPr lvl="1" marL="432000" indent="-216000">
+              <a:lnSpc>
+                <a:spcPct val="90000"/>
+              </a:lnSpc>
+              <a:buClr>
+                <a:srgbClr val="000000"/>
+              </a:buClr>
+              <a:buSzPct val="45000"/>
+              <a:buFont typeface="Wingdings" charset="2"/>
+              <a:buChar char=""/>
+            </a:pPr>
+            <a:r>
+              <a:rPr b="0" lang="en-US" sz="2800" spc="-1" strike="noStrike">
+                <a:solidFill>
+                  <a:srgbClr val="000000"/>
+                </a:solidFill>
+                <a:uFill>
+                  <a:solidFill>
+                    <a:srgbClr val="ffffff"/>
+                  </a:solidFill>
+                </a:uFill>
+                <a:latin typeface="Calibri"/>
+                <a:ea typeface="DejaVu Sans"/>
+              </a:rPr>
+              <a:t>RVIZ for visualization</a:t>
+            </a:r>
+            <a:endParaRPr b="0" lang="en-US" sz="1800" spc="-1" strike="noStrike">
+              <a:solidFill>
+                <a:srgbClr val="000000"/>
+              </a:solidFill>
+              <a:uFill>
+                <a:solidFill>
+                  <a:srgbClr val="ffffff"/>
+                </a:solidFill>
+              </a:uFill>
+              <a:latin typeface="Arial"/>
+            </a:endParaRPr>
+          </a:p>
+          <a:p>
+            <a:pPr lvl="2" marL="648000" indent="-216000">
+              <a:lnSpc>
+                <a:spcPct val="90000"/>
+              </a:lnSpc>
+              <a:buClr>
+                <a:srgbClr val="000000"/>
+              </a:buClr>
+              <a:buSzPct val="45000"/>
+              <a:buFont typeface="Wingdings" charset="2"/>
+              <a:buChar char=""/>
+            </a:pPr>
+            <a:r>
+              <a:rPr b="0" lang="en-US" sz="2800" spc="-1" strike="noStrike">
+                <a:solidFill>
+                  <a:srgbClr val="000000"/>
+                </a:solidFill>
+                <a:uFill>
+                  <a:solidFill>
+                    <a:srgbClr val="ffffff"/>
+                  </a:solidFill>
+                </a:uFill>
+                <a:latin typeface="Calibri"/>
+                <a:ea typeface="DejaVu Sans"/>
+              </a:rPr>
+              <a:t>Not being able to use Tesla stl file</a:t>
+            </a:r>
+            <a:endParaRPr b="0" lang="en-US" sz="1800" spc="-1" strike="noStrike">
+              <a:solidFill>
+                <a:srgbClr val="000000"/>
+              </a:solidFill>
+              <a:uFill>
+                <a:solidFill>
+                  <a:srgbClr val="ffffff"/>
+                </a:solidFill>
+              </a:uFill>
+              <a:latin typeface="Arial"/>
+            </a:endParaRPr>
+          </a:p>
+          <a:p>
+            <a:pPr lvl="1" marL="432000" indent="-216000">
+              <a:lnSpc>
+                <a:spcPct val="90000"/>
+              </a:lnSpc>
+              <a:buClr>
+                <a:srgbClr val="000000"/>
+              </a:buClr>
+              <a:buSzPct val="45000"/>
+              <a:buFont typeface="Wingdings" charset="2"/>
+              <a:buChar char=""/>
+            </a:pPr>
+            <a:r>
+              <a:rPr b="0" lang="en-US" sz="2800" spc="-1" strike="noStrike">
+                <a:solidFill>
+                  <a:srgbClr val="000000"/>
+                </a:solidFill>
+                <a:uFill>
+                  <a:solidFill>
+                    <a:srgbClr val="ffffff"/>
+                  </a:solidFill>
+                </a:uFill>
+                <a:latin typeface="Calibri"/>
+                <a:ea typeface="DejaVu Sans"/>
+              </a:rPr>
+              <a:t>Our policy</a:t>
+            </a:r>
+            <a:endParaRPr b="0" lang="en-US" sz="1800" spc="-1" strike="noStrike">
+              <a:solidFill>
+                <a:srgbClr val="000000"/>
+              </a:solidFill>
+              <a:uFill>
+                <a:solidFill>
+                  <a:srgbClr val="ffffff"/>
+                </a:solidFill>
+              </a:uFill>
+              <a:latin typeface="Arial"/>
+            </a:endParaRPr>
+          </a:p>
+          <a:p>
+            <a:pPr lvl="2" marL="648000" indent="-216000">
+              <a:lnSpc>
+                <a:spcPct val="90000"/>
+              </a:lnSpc>
+              <a:buClr>
+                <a:srgbClr val="000000"/>
+              </a:buClr>
+              <a:buSzPct val="45000"/>
+              <a:buFont typeface="Wingdings" charset="2"/>
+              <a:buChar char=""/>
+            </a:pPr>
+            <a:r>
+              <a:rPr b="0" lang="en-US" sz="2800" spc="-1" strike="noStrike">
+                <a:solidFill>
+                  <a:srgbClr val="000000"/>
+                </a:solidFill>
+                <a:uFill>
+                  <a:solidFill>
+                    <a:srgbClr val="ffffff"/>
+                  </a:solidFill>
+                </a:uFill>
+                <a:latin typeface="Calibri"/>
+                <a:ea typeface="DejaVu Sans"/>
+              </a:rPr>
+              <a:t>Small edge cases causing failures</a:t>
+            </a:r>
+            <a:endParaRPr b="0" lang="en-US" sz="1800" spc="-1" strike="noStrike">
+              <a:solidFill>
+                <a:srgbClr val="000000"/>
+              </a:solidFill>
+              <a:uFill>
+                <a:solidFill>
+                  <a:srgbClr val="ffffff"/>
+                </a:solidFill>
+              </a:uFill>
+              <a:latin typeface="Arial"/>
+            </a:endParaRPr>
+          </a:p>
+        </p:txBody>
+      </p:sp>
     </p:spTree>
   </p:cSld>
-  <p:timing>
-    <p:tnLst>
-      <p:par>
-        <p:cTn id="7" dur="indefinite" restart="never" nodeType="tmRoot">
-          <p:childTnLst>
-            <p:seq>
-              <p:cTn id="8" nodeType="mainSeq"/>
-              <p:prevCondLst>
-                <p:cond delay="0" evt="onPrev">
-                  <p:tgtEl>
-                    <p:sldTgt/>
-                  </p:tgtEl>
-                </p:cond>
-              </p:prevCondLst>
-              <p:nextCondLst>
-                <p:cond delay="0" evt="onNext">
-                  <p:tgtEl>
-                    <p:sldTgt/>
-                  </p:tgtEl>
-                </p:cond>
-              </p:nextCondLst>
-            </p:seq>
-          </p:childTnLst>
-        </p:cTn>
-      </p:par>
-    </p:tnLst>
-  </p:timing>
 </p:sld>
 </file>
 
@@ -8181,13 +8812,13 @@
       </p:grpSpPr>
       <p:sp>
         <p:nvSpPr>
-          <p:cNvPr id="150" name="CustomShape 1"/>
+          <p:cNvPr id="151" name="CustomShape 1"/>
           <p:cNvSpPr/>
           <p:nvPr/>
         </p:nvSpPr>
         <p:spPr>
           <a:xfrm>
-            <a:off x="516600" y="0"/>
+            <a:off x="522360" y="0"/>
             <a:ext cx="10514520" cy="1324440"/>
           </a:xfrm>
           <a:prstGeom prst="rect">
@@ -8225,7 +8856,7 @@
                 <a:latin typeface="Andalus"/>
                 <a:ea typeface="DejaVu Sans"/>
               </a:rPr>
-              <a:t>Challenges &amp; Time Crunch</a:t>
+              <a:t>Collision Avoidance Policy</a:t>
             </a:r>
             <a:endParaRPr b="0" lang="en-US" sz="1800" spc="-1" strike="noStrike">
               <a:solidFill>
@@ -8243,14 +8874,14 @@
       </p:sp>
       <p:sp>
         <p:nvSpPr>
-          <p:cNvPr id="151" name="CustomShape 2"/>
+          <p:cNvPr id="152" name="CustomShape 2"/>
           <p:cNvSpPr/>
           <p:nvPr/>
         </p:nvSpPr>
         <p:spPr>
           <a:xfrm>
-            <a:off x="455760" y="1496880"/>
-            <a:ext cx="10506600" cy="516600"/>
+            <a:off x="598320" y="1640880"/>
+            <a:ext cx="10362600" cy="3958920"/>
           </a:xfrm>
           <a:prstGeom prst="rect">
             <a:avLst/>
@@ -8269,15 +8900,16 @@
         <p:txBody>
           <a:bodyPr lIns="90000" rIns="90000" tIns="45000" bIns="45000"/>
           <a:p>
-            <a:pPr marL="285840" indent="-285120">
+            <a:pPr marL="216000" indent="-216000">
               <a:lnSpc>
-                <a:spcPct val="100000"/>
+                <a:spcPct val="90000"/>
               </a:lnSpc>
               <a:buClr>
                 <a:srgbClr val="000000"/>
               </a:buClr>
-              <a:buFont typeface="Arial"/>
-              <a:buChar char="•"/>
+              <a:buSzPct val="45000"/>
+              <a:buFont typeface="Wingdings" charset="2"/>
+              <a:buChar char=""/>
             </a:pPr>
             <a:r>
               <a:rPr b="0" lang="en-US" sz="2800" spc="-1" strike="noStrike">
@@ -8292,7 +8924,7 @@
                 <a:latin typeface="Calibri"/>
                 <a:ea typeface="DejaVu Sans"/>
               </a:rPr>
-              <a:t>Developing a stress testing technique (on hold)</a:t>
+              <a:t>Try trajectory with desired velocity</a:t>
             </a:r>
             <a:endParaRPr b="0" lang="en-US" sz="1800" spc="-1" strike="noStrike">
               <a:solidFill>
@@ -8306,37 +8938,223 @@
               <a:latin typeface="Arial"/>
             </a:endParaRPr>
           </a:p>
+          <a:p>
+            <a:pPr lvl="1" marL="432000" indent="-216000">
+              <a:lnSpc>
+                <a:spcPct val="90000"/>
+              </a:lnSpc>
+              <a:buClr>
+                <a:srgbClr val="000000"/>
+              </a:buClr>
+              <a:buSzPct val="45000"/>
+              <a:buFont typeface="Wingdings" charset="2"/>
+              <a:buChar char=""/>
+            </a:pPr>
+            <a:r>
+              <a:rPr b="0" lang="en-US" sz="2800" spc="-1" strike="noStrike">
+                <a:solidFill>
+                  <a:srgbClr val="000000"/>
+                </a:solidFill>
+                <a:uFill>
+                  <a:solidFill>
+                    <a:srgbClr val="ffffff"/>
+                  </a:solidFill>
+                </a:uFill>
+                <a:latin typeface="Calibri"/>
+                <a:ea typeface="DejaVu Sans"/>
+              </a:rPr>
+              <a:t>Identify point of collision</a:t>
+            </a:r>
+            <a:endParaRPr b="0" lang="en-US" sz="1800" spc="-1" strike="noStrike">
+              <a:solidFill>
+                <a:srgbClr val="000000"/>
+              </a:solidFill>
+              <a:uFill>
+                <a:solidFill>
+                  <a:srgbClr val="ffffff"/>
+                </a:solidFill>
+              </a:uFill>
+              <a:latin typeface="Arial"/>
+            </a:endParaRPr>
+          </a:p>
+          <a:p>
+            <a:pPr lvl="1" marL="432000" indent="-216000">
+              <a:lnSpc>
+                <a:spcPct val="90000"/>
+              </a:lnSpc>
+              <a:buClr>
+                <a:srgbClr val="000000"/>
+              </a:buClr>
+              <a:buSzPct val="45000"/>
+              <a:buFont typeface="Wingdings" charset="2"/>
+              <a:buChar char=""/>
+            </a:pPr>
+            <a:r>
+              <a:rPr b="0" lang="en-US" sz="2800" spc="-1" strike="noStrike">
+                <a:solidFill>
+                  <a:srgbClr val="000000"/>
+                </a:solidFill>
+                <a:uFill>
+                  <a:solidFill>
+                    <a:srgbClr val="ffffff"/>
+                  </a:solidFill>
+                </a:uFill>
+                <a:latin typeface="Calibri"/>
+                <a:ea typeface="DejaVu Sans"/>
+              </a:rPr>
+              <a:t>Slow down or speed up car</a:t>
+            </a:r>
+            <a:endParaRPr b="0" lang="en-US" sz="1800" spc="-1" strike="noStrike">
+              <a:solidFill>
+                <a:srgbClr val="000000"/>
+              </a:solidFill>
+              <a:uFill>
+                <a:solidFill>
+                  <a:srgbClr val="ffffff"/>
+                </a:solidFill>
+              </a:uFill>
+              <a:latin typeface="Arial"/>
+            </a:endParaRPr>
+          </a:p>
+          <a:p>
+            <a:pPr lvl="1" marL="432000" indent="-216000">
+              <a:lnSpc>
+                <a:spcPct val="90000"/>
+              </a:lnSpc>
+              <a:buClr>
+                <a:srgbClr val="000000"/>
+              </a:buClr>
+              <a:buSzPct val="45000"/>
+              <a:buFont typeface="Wingdings" charset="2"/>
+              <a:buChar char=""/>
+            </a:pPr>
+            <a:r>
+              <a:rPr b="0" lang="en-US" sz="2800" spc="-1" strike="noStrike">
+                <a:solidFill>
+                  <a:srgbClr val="000000"/>
+                </a:solidFill>
+                <a:uFill>
+                  <a:solidFill>
+                    <a:srgbClr val="ffffff"/>
+                  </a:solidFill>
+                </a:uFill>
+                <a:latin typeface="Calibri"/>
+                <a:ea typeface="DejaVu Sans"/>
+              </a:rPr>
+              <a:t>Try new trajectory</a:t>
+            </a:r>
+            <a:endParaRPr b="0" lang="en-US" sz="1800" spc="-1" strike="noStrike">
+              <a:solidFill>
+                <a:srgbClr val="000000"/>
+              </a:solidFill>
+              <a:uFill>
+                <a:solidFill>
+                  <a:srgbClr val="ffffff"/>
+                </a:solidFill>
+              </a:uFill>
+              <a:latin typeface="Arial"/>
+            </a:endParaRPr>
+          </a:p>
+          <a:p>
+            <a:pPr lvl="1" marL="432000" indent="-216000">
+              <a:lnSpc>
+                <a:spcPct val="90000"/>
+              </a:lnSpc>
+              <a:buClr>
+                <a:srgbClr val="000000"/>
+              </a:buClr>
+              <a:buSzPct val="45000"/>
+              <a:buFont typeface="Wingdings" charset="2"/>
+              <a:buChar char=""/>
+            </a:pPr>
+            <a:r>
+              <a:rPr b="0" lang="en-US" sz="2800" spc="-1" strike="noStrike">
+                <a:solidFill>
+                  <a:srgbClr val="000000"/>
+                </a:solidFill>
+                <a:uFill>
+                  <a:solidFill>
+                    <a:srgbClr val="ffffff"/>
+                  </a:solidFill>
+                </a:uFill>
+                <a:latin typeface="Calibri"/>
+                <a:ea typeface="DejaVu Sans"/>
+              </a:rPr>
+              <a:t>Try opposite speed </a:t>
+            </a:r>
+            <a:endParaRPr b="0" lang="en-US" sz="1800" spc="-1" strike="noStrike">
+              <a:solidFill>
+                <a:srgbClr val="000000"/>
+              </a:solidFill>
+              <a:uFill>
+                <a:solidFill>
+                  <a:srgbClr val="ffffff"/>
+                </a:solidFill>
+              </a:uFill>
+              <a:latin typeface="Arial"/>
+            </a:endParaRPr>
+          </a:p>
+          <a:p>
+            <a:pPr marL="216000" indent="-216000">
+              <a:lnSpc>
+                <a:spcPct val="100000"/>
+              </a:lnSpc>
+              <a:buClr>
+                <a:srgbClr val="000000"/>
+              </a:buClr>
+              <a:buSzPct val="45000"/>
+              <a:buFont typeface="Wingdings" charset="2"/>
+              <a:buChar char=""/>
+            </a:pPr>
+            <a:r>
+              <a:rPr b="0" lang="en-US" sz="2800" spc="-1" strike="noStrike">
+                <a:solidFill>
+                  <a:srgbClr val="000000"/>
+                </a:solidFill>
+                <a:uFill>
+                  <a:solidFill>
+                    <a:srgbClr val="ffffff"/>
+                  </a:solidFill>
+                </a:uFill>
+                <a:latin typeface="Calibri"/>
+                <a:ea typeface="DejaVu Sans"/>
+              </a:rPr>
+              <a:t>Return success or failure</a:t>
+            </a:r>
+            <a:endParaRPr b="0" lang="en-US" sz="1800" spc="-1" strike="noStrike">
+              <a:solidFill>
+                <a:srgbClr val="000000"/>
+              </a:solidFill>
+              <a:uFill>
+                <a:solidFill>
+                  <a:srgbClr val="ffffff"/>
+                </a:solidFill>
+              </a:uFill>
+              <a:latin typeface="Arial"/>
+            </a:endParaRPr>
+          </a:p>
+          <a:p>
+            <a:pPr>
+              <a:lnSpc>
+                <a:spcPct val="100000"/>
+              </a:lnSpc>
+            </a:pPr>
+            <a:endParaRPr b="0" lang="en-US" sz="1800" spc="-1" strike="noStrike">
+              <a:solidFill>
+                <a:srgbClr val="000000"/>
+              </a:solidFill>
+              <a:uFill>
+                <a:solidFill>
+                  <a:srgbClr val="ffffff"/>
+                </a:solidFill>
+              </a:uFill>
+              <a:latin typeface="Arial"/>
+            </a:endParaRPr>
+          </a:p>
         </p:txBody>
       </p:sp>
     </p:spTree>
   </p:cSld>
-  <p:timing>
-    <p:tnLst>
-      <p:par>
-        <p:cTn id="9" dur="indefinite" restart="never" nodeType="tmRoot">
-          <p:childTnLst>
-            <p:seq>
-              <p:cTn id="10" nodeType="mainSeq"/>
-              <p:prevCondLst>
-                <p:cond delay="0" evt="onPrev">
-                  <p:tgtEl>
-                    <p:sldTgt/>
-                  </p:tgtEl>
-                </p:cond>
-              </p:prevCondLst>
-              <p:nextCondLst>
-                <p:cond delay="0" evt="onNext">
-                  <p:tgtEl>
-                    <p:sldTgt/>
-                  </p:tgtEl>
-                </p:cond>
-              </p:nextCondLst>
-            </p:seq>
-          </p:childTnLst>
-        </p:cTn>
-      </p:par>
-    </p:tnLst>
-  </p:timing>
 </p:sld>
 </file>
 
@@ -8359,14 +9177,14 @@
       </p:grpSpPr>
       <p:sp>
         <p:nvSpPr>
-          <p:cNvPr id="152" name="CustomShape 1"/>
+          <p:cNvPr id="153" name="CustomShape 1"/>
           <p:cNvSpPr/>
           <p:nvPr/>
         </p:nvSpPr>
         <p:spPr>
           <a:xfrm>
-            <a:off x="522360" y="0"/>
-            <a:ext cx="10514520" cy="1324440"/>
+            <a:off x="284040" y="262800"/>
+            <a:ext cx="6482160" cy="1329120"/>
           </a:xfrm>
           <a:prstGeom prst="rect">
             <a:avLst/>
@@ -8383,7 +9201,7 @@
           <a:fontRef idx="minor"/>
         </p:style>
         <p:txBody>
-          <a:bodyPr lIns="0" rIns="0" tIns="0" bIns="0" anchor="ctr"/>
+          <a:bodyPr lIns="90000" rIns="90000" tIns="45000" bIns="45000"/>
           <a:p>
             <a:pPr>
               <a:lnSpc>
@@ -8403,7 +9221,7 @@
                 <a:latin typeface="Andalus"/>
                 <a:ea typeface="DejaVu Sans"/>
               </a:rPr>
-              <a:t>Have we hit our Measures of Success?</a:t>
+              <a:t>All Policies</a:t>
             </a:r>
             <a:endParaRPr b="0" lang="en-US" sz="1800" spc="-1" strike="noStrike">
               <a:solidFill>
@@ -8419,343 +9237,8 @@
           </a:p>
         </p:txBody>
       </p:sp>
-      <p:sp>
-        <p:nvSpPr>
-          <p:cNvPr id="153" name="CustomShape 2"/>
-          <p:cNvSpPr/>
-          <p:nvPr/>
-        </p:nvSpPr>
-        <p:spPr>
-          <a:xfrm>
-            <a:off x="598320" y="1640880"/>
-            <a:ext cx="10362600" cy="3958920"/>
-          </a:xfrm>
-          <a:prstGeom prst="rect">
-            <a:avLst/>
-          </a:prstGeom>
-          <a:noFill/>
-          <a:ln>
-            <a:noFill/>
-          </a:ln>
-        </p:spPr>
-        <p:style>
-          <a:lnRef idx="0"/>
-          <a:fillRef idx="0"/>
-          <a:effectRef idx="0"/>
-          <a:fontRef idx="minor"/>
-        </p:style>
-        <p:txBody>
-          <a:bodyPr lIns="90000" rIns="90000" tIns="45000" bIns="45000"/>
-          <a:p>
-            <a:pPr>
-              <a:lnSpc>
-                <a:spcPct val="100000"/>
-              </a:lnSpc>
-            </a:pPr>
-            <a:r>
-              <a:rPr b="0" lang="en-US" sz="2600" spc="-1" strike="noStrike">
-                <a:solidFill>
-                  <a:srgbClr val="000000"/>
-                </a:solidFill>
-                <a:uFill>
-                  <a:solidFill>
-                    <a:srgbClr val="ffffff"/>
-                  </a:solidFill>
-                </a:uFill>
-                <a:latin typeface="Calibri"/>
-                <a:ea typeface="DejaVu Sans"/>
-              </a:rPr>
-              <a:t>Comparing efficiency (delay) between different modes</a:t>
-            </a:r>
-            <a:endParaRPr b="0" lang="en-US" sz="1800" spc="-1" strike="noStrike">
-              <a:solidFill>
-                <a:srgbClr val="000000"/>
-              </a:solidFill>
-              <a:uFill>
-                <a:solidFill>
-                  <a:srgbClr val="ffffff"/>
-                </a:solidFill>
-              </a:uFill>
-              <a:latin typeface="Arial"/>
-            </a:endParaRPr>
-          </a:p>
-          <a:p>
-            <a:pPr lvl="2" marL="1200240" indent="-285120">
-              <a:lnSpc>
-                <a:spcPct val="100000"/>
-              </a:lnSpc>
-              <a:buClr>
-                <a:srgbClr val="000000"/>
-              </a:buClr>
-              <a:buFont typeface="Arial"/>
-              <a:buChar char="•"/>
-            </a:pPr>
-            <a:r>
-              <a:rPr b="0" lang="en-US" sz="2400" spc="-1" strike="noStrike">
-                <a:solidFill>
-                  <a:srgbClr val="000000"/>
-                </a:solidFill>
-                <a:uFill>
-                  <a:solidFill>
-                    <a:srgbClr val="ffffff"/>
-                  </a:solidFill>
-                </a:uFill>
-                <a:latin typeface="Calibri"/>
-                <a:ea typeface="DejaVu Sans"/>
-              </a:rPr>
-              <a:t>Traffic Lights</a:t>
-            </a:r>
-            <a:endParaRPr b="0" lang="en-US" sz="1800" spc="-1" strike="noStrike">
-              <a:solidFill>
-                <a:srgbClr val="000000"/>
-              </a:solidFill>
-              <a:uFill>
-                <a:solidFill>
-                  <a:srgbClr val="ffffff"/>
-                </a:solidFill>
-              </a:uFill>
-              <a:latin typeface="Arial"/>
-            </a:endParaRPr>
-          </a:p>
-          <a:p>
-            <a:pPr lvl="2" marL="1200240" indent="-285120">
-              <a:lnSpc>
-                <a:spcPct val="100000"/>
-              </a:lnSpc>
-              <a:buClr>
-                <a:srgbClr val="000000"/>
-              </a:buClr>
-              <a:buFont typeface="Arial"/>
-              <a:buChar char="•"/>
-            </a:pPr>
-            <a:r>
-              <a:rPr b="0" lang="en-US" sz="2400" spc="-1" strike="noStrike">
-                <a:solidFill>
-                  <a:srgbClr val="000000"/>
-                </a:solidFill>
-                <a:uFill>
-                  <a:solidFill>
-                    <a:srgbClr val="ffffff"/>
-                  </a:solidFill>
-                </a:uFill>
-                <a:latin typeface="Calibri"/>
-                <a:ea typeface="DejaVu Sans"/>
-              </a:rPr>
-              <a:t>Stops Signs</a:t>
-            </a:r>
-            <a:endParaRPr b="0" lang="en-US" sz="1800" spc="-1" strike="noStrike">
-              <a:solidFill>
-                <a:srgbClr val="000000"/>
-              </a:solidFill>
-              <a:uFill>
-                <a:solidFill>
-                  <a:srgbClr val="ffffff"/>
-                </a:solidFill>
-              </a:uFill>
-              <a:latin typeface="Arial"/>
-            </a:endParaRPr>
-          </a:p>
-          <a:p>
-            <a:pPr lvl="2" marL="1200240" indent="-285120">
-              <a:lnSpc>
-                <a:spcPct val="100000"/>
-              </a:lnSpc>
-              <a:buClr>
-                <a:srgbClr val="000000"/>
-              </a:buClr>
-              <a:buFont typeface="Arial"/>
-              <a:buChar char="•"/>
-            </a:pPr>
-            <a:r>
-              <a:rPr b="0" lang="en-US" sz="2400" spc="-1" strike="noStrike">
-                <a:solidFill>
-                  <a:srgbClr val="000000"/>
-                </a:solidFill>
-                <a:uFill>
-                  <a:solidFill>
-                    <a:srgbClr val="ffffff"/>
-                  </a:solidFill>
-                </a:uFill>
-                <a:latin typeface="Calibri"/>
-                <a:ea typeface="DejaVu Sans"/>
-              </a:rPr>
-              <a:t>Dresner &amp; Stone’s policy</a:t>
-            </a:r>
-            <a:endParaRPr b="0" lang="en-US" sz="1800" spc="-1" strike="noStrike">
-              <a:solidFill>
-                <a:srgbClr val="000000"/>
-              </a:solidFill>
-              <a:uFill>
-                <a:solidFill>
-                  <a:srgbClr val="ffffff"/>
-                </a:solidFill>
-              </a:uFill>
-              <a:latin typeface="Arial"/>
-            </a:endParaRPr>
-          </a:p>
-          <a:p>
-            <a:pPr lvl="2" marL="1200240" indent="-285120">
-              <a:lnSpc>
-                <a:spcPct val="100000"/>
-              </a:lnSpc>
-              <a:buClr>
-                <a:srgbClr val="000000"/>
-              </a:buClr>
-              <a:buFont typeface="Arial"/>
-              <a:buChar char="•"/>
-            </a:pPr>
-            <a:r>
-              <a:rPr b="0" lang="en-US" sz="2400" spc="-1" strike="noStrike">
-                <a:solidFill>
-                  <a:srgbClr val="000000"/>
-                </a:solidFill>
-                <a:uFill>
-                  <a:solidFill>
-                    <a:srgbClr val="ffffff"/>
-                  </a:solidFill>
-                </a:uFill>
-                <a:latin typeface="Calibri"/>
-                <a:ea typeface="DejaVu Sans"/>
-              </a:rPr>
-              <a:t>Our policy</a:t>
-            </a:r>
-            <a:endParaRPr b="0" lang="en-US" sz="1800" spc="-1" strike="noStrike">
-              <a:solidFill>
-                <a:srgbClr val="000000"/>
-              </a:solidFill>
-              <a:uFill>
-                <a:solidFill>
-                  <a:srgbClr val="ffffff"/>
-                </a:solidFill>
-              </a:uFill>
-              <a:latin typeface="Arial"/>
-            </a:endParaRPr>
-          </a:p>
-          <a:p>
-            <a:pPr lvl="1" marL="743040" indent="-285120">
-              <a:lnSpc>
-                <a:spcPct val="100000"/>
-              </a:lnSpc>
-              <a:buClr>
-                <a:srgbClr val="000000"/>
-              </a:buClr>
-              <a:buFont typeface="Arial"/>
-              <a:buChar char="•"/>
-            </a:pPr>
-            <a:r>
-              <a:rPr b="0" lang="en-US" sz="2600" spc="-1" strike="noStrike">
-                <a:solidFill>
-                  <a:srgbClr val="000000"/>
-                </a:solidFill>
-                <a:uFill>
-                  <a:solidFill>
-                    <a:srgbClr val="ffffff"/>
-                  </a:solidFill>
-                </a:uFill>
-                <a:latin typeface="Calibri"/>
-                <a:ea typeface="DejaVu Sans"/>
-              </a:rPr>
-              <a:t>Our policy should at least provide shorter delays than current Traffic Light and Stop sign systems</a:t>
-            </a:r>
-            <a:endParaRPr b="0" lang="en-US" sz="1800" spc="-1" strike="noStrike">
-              <a:solidFill>
-                <a:srgbClr val="000000"/>
-              </a:solidFill>
-              <a:uFill>
-                <a:solidFill>
-                  <a:srgbClr val="ffffff"/>
-                </a:solidFill>
-              </a:uFill>
-              <a:latin typeface="Arial"/>
-            </a:endParaRPr>
-          </a:p>
-          <a:p>
-            <a:pPr lvl="1" marL="743040" indent="-285120">
-              <a:lnSpc>
-                <a:spcPct val="100000"/>
-              </a:lnSpc>
-              <a:buClr>
-                <a:srgbClr val="000000"/>
-              </a:buClr>
-              <a:buFont typeface="Arial"/>
-              <a:buChar char="•"/>
-            </a:pPr>
-            <a:r>
-              <a:rPr b="0" lang="en-US" sz="2600" spc="-1" strike="noStrike">
-                <a:solidFill>
-                  <a:srgbClr val="000000"/>
-                </a:solidFill>
-                <a:uFill>
-                  <a:solidFill>
-                    <a:srgbClr val="ffffff"/>
-                  </a:solidFill>
-                </a:uFill>
-                <a:latin typeface="Calibri"/>
-                <a:ea typeface="DejaVu Sans"/>
-              </a:rPr>
-              <a:t>Stretch goal: Shorter delay than Dresner &amp; Stone’s policy</a:t>
-            </a:r>
-            <a:endParaRPr b="0" lang="en-US" sz="1800" spc="-1" strike="noStrike">
-              <a:solidFill>
-                <a:srgbClr val="000000"/>
-              </a:solidFill>
-              <a:uFill>
-                <a:solidFill>
-                  <a:srgbClr val="ffffff"/>
-                </a:solidFill>
-              </a:uFill>
-              <a:latin typeface="Arial"/>
-            </a:endParaRPr>
-          </a:p>
-          <a:p>
-            <a:pPr>
-              <a:lnSpc>
-                <a:spcPct val="100000"/>
-              </a:lnSpc>
-            </a:pPr>
-            <a:endParaRPr b="0" lang="en-US" sz="1800" spc="-1" strike="noStrike">
-              <a:solidFill>
-                <a:srgbClr val="000000"/>
-              </a:solidFill>
-              <a:uFill>
-                <a:solidFill>
-                  <a:srgbClr val="ffffff"/>
-                </a:solidFill>
-              </a:uFill>
-              <a:latin typeface="Arial"/>
-            </a:endParaRPr>
-          </a:p>
-        </p:txBody>
-      </p:sp>
     </p:spTree>
   </p:cSld>
-  <p:timing>
-    <p:tnLst>
-      <p:par>
-        <p:cTn id="11" dur="indefinite" restart="never" nodeType="tmRoot">
-          <p:childTnLst>
-            <p:seq>
-              <p:cTn id="12" nodeType="mainSeq"/>
-              <p:prevCondLst>
-                <p:cond delay="0" evt="onPrev">
-                  <p:tgtEl>
-                    <p:sldTgt/>
-                  </p:tgtEl>
-                </p:cond>
-              </p:prevCondLst>
-              <p:nextCondLst>
-                <p:cond delay="0" evt="onNext">
-                  <p:tgtEl>
-                    <p:sldTgt/>
-                  </p:tgtEl>
-                </p:cond>
-              </p:nextCondLst>
-            </p:seq>
-          </p:childTnLst>
-        </p:cTn>
-      </p:par>
-    </p:tnLst>
-  </p:timing>
 </p:sld>
 </file>
 
@@ -8784,8 +9267,8 @@
         </p:nvSpPr>
         <p:spPr>
           <a:xfrm>
-            <a:off x="838080" y="48960"/>
-            <a:ext cx="10514520" cy="1956960"/>
+            <a:off x="522360" y="0"/>
+            <a:ext cx="10514520" cy="1324440"/>
           </a:xfrm>
           <a:prstGeom prst="rect">
             <a:avLst/>
@@ -8804,6 +9287,11 @@
         <p:txBody>
           <a:bodyPr lIns="0" rIns="0" tIns="0" bIns="0" anchor="ctr"/>
           <a:p>
+            <a:pPr>
+              <a:lnSpc>
+                <a:spcPct val="90000"/>
+              </a:lnSpc>
+            </a:pPr>
             <a:r>
               <a:rPr b="0" lang="en-US" sz="4400" spc="-1" strike="noStrike">
                 <a:solidFill>
@@ -8817,7 +9305,7 @@
                 <a:latin typeface="Andalus"/>
                 <a:ea typeface="DejaVu Sans"/>
               </a:rPr>
-              <a:t>Graph with analysis of delay per policy with N increasing to about a 100</a:t>
+              <a:t>Have we hit our Measures of Success?</a:t>
             </a:r>
             <a:endParaRPr b="0" lang="en-US" sz="1800" spc="-1" strike="noStrike">
               <a:solidFill>
@@ -8841,8 +9329,8 @@
         </p:nvSpPr>
         <p:spPr>
           <a:xfrm>
-            <a:off x="640440" y="2057760"/>
-            <a:ext cx="10972080" cy="3976920"/>
+            <a:off x="598320" y="1640880"/>
+            <a:ext cx="10362600" cy="3958920"/>
           </a:xfrm>
           <a:prstGeom prst="rect">
             <a:avLst/>
@@ -8859,21 +9347,15 @@
           <a:fontRef idx="minor"/>
         </p:style>
         <p:txBody>
-          <a:bodyPr lIns="0" rIns="0" tIns="0" bIns="0"/>
-          <a:p>
-            <a:pPr marL="432000" indent="-323640">
+          <a:bodyPr lIns="90000" rIns="90000" tIns="45000" bIns="45000"/>
+          <a:p>
+            <a:pPr>
               <a:lnSpc>
                 <a:spcPct val="100000"/>
               </a:lnSpc>
-              <a:buClr>
-                <a:srgbClr val="000000"/>
-              </a:buClr>
-              <a:buSzPct val="45000"/>
-              <a:buFont typeface="Wingdings" charset="2"/>
-              <a:buChar char=""/>
             </a:pPr>
             <a:r>
-              <a:rPr b="0" lang="en-US" sz="2800" spc="-1" strike="noStrike">
+              <a:rPr b="0" lang="en-US" sz="2600" spc="-1" strike="noStrike">
                 <a:solidFill>
                   <a:srgbClr val="000000"/>
                 </a:solidFill>
@@ -8882,9 +9364,10 @@
                     <a:srgbClr val="ffffff"/>
                   </a:solidFill>
                 </a:uFill>
-                <a:latin typeface="Arial"/>
+                <a:latin typeface="Calibri"/>
+                <a:ea typeface="DejaVu Sans"/>
               </a:rPr>
-              <a:t>Avg Delay:</a:t>
+              <a:t>Comparing efficiency (delay) between different modes</a:t>
             </a:r>
             <a:endParaRPr b="0" lang="en-US" sz="1800" spc="-1" strike="noStrike">
               <a:solidFill>
@@ -8899,19 +9382,18 @@
             </a:endParaRPr>
           </a:p>
           <a:p>
-            <a:pPr lvl="1" marL="864000" indent="-323640">
+            <a:pPr lvl="2" marL="1200240" indent="-285120">
               <a:lnSpc>
                 <a:spcPct val="100000"/>
               </a:lnSpc>
               <a:buClr>
                 <a:srgbClr val="000000"/>
               </a:buClr>
-              <a:buSzPct val="75000"/>
-              <a:buFont typeface="Symbol"/>
-              <a:buChar char=""/>
+              <a:buFont typeface="Arial"/>
+              <a:buChar char="•"/>
             </a:pPr>
             <a:r>
-              <a:rPr b="0" lang="en-US" sz="2000" spc="-1" strike="noStrike">
+              <a:rPr b="0" lang="en-US" sz="2400" spc="-1" strike="noStrike">
                 <a:solidFill>
                   <a:srgbClr val="000000"/>
                 </a:solidFill>
@@ -8920,9 +9402,10 @@
                     <a:srgbClr val="ffffff"/>
                   </a:solidFill>
                 </a:uFill>
-                <a:latin typeface="Arial"/>
+                <a:latin typeface="Calibri"/>
+                <a:ea typeface="DejaVu Sans"/>
               </a:rPr>
-              <a:t>Policy 0 (Old): 100 cars in 20 secs 22.4 Avg delay (took 146 sec execution)</a:t>
+              <a:t>Traffic Lights</a:t>
             </a:r>
             <a:endParaRPr b="0" lang="en-US" sz="1800" spc="-1" strike="noStrike">
               <a:solidFill>
@@ -8937,19 +9420,18 @@
             </a:endParaRPr>
           </a:p>
           <a:p>
-            <a:pPr lvl="1" marL="864000" indent="-323640">
+            <a:pPr lvl="2" marL="1200240" indent="-285120">
               <a:lnSpc>
                 <a:spcPct val="100000"/>
               </a:lnSpc>
               <a:buClr>
                 <a:srgbClr val="000000"/>
               </a:buClr>
-              <a:buSzPct val="75000"/>
-              <a:buFont typeface="Symbol"/>
-              <a:buChar char=""/>
+              <a:buFont typeface="Arial"/>
+              <a:buChar char="•"/>
             </a:pPr>
             <a:r>
-              <a:rPr b="0" lang="en-US" sz="2000" spc="-1" strike="noStrike">
+              <a:rPr b="0" lang="en-US" sz="2400" spc="-1" strike="noStrike">
                 <a:solidFill>
                   <a:srgbClr val="000000"/>
                 </a:solidFill>
@@ -8958,9 +9440,10 @@
                     <a:srgbClr val="ffffff"/>
                   </a:solidFill>
                 </a:uFill>
-                <a:latin typeface="Arial"/>
+                <a:latin typeface="Calibri"/>
+                <a:ea typeface="DejaVu Sans"/>
               </a:rPr>
-              <a:t>Policy 1:</a:t>
+              <a:t>Stops Signs</a:t>
             </a:r>
             <a:endParaRPr b="0" lang="en-US" sz="1800" spc="-1" strike="noStrike">
               <a:solidFill>
@@ -8975,19 +9458,18 @@
             </a:endParaRPr>
           </a:p>
           <a:p>
-            <a:pPr lvl="1" marL="864000" indent="-323640">
+            <a:pPr lvl="2" marL="1200240" indent="-285120">
               <a:lnSpc>
                 <a:spcPct val="100000"/>
               </a:lnSpc>
               <a:buClr>
                 <a:srgbClr val="000000"/>
               </a:buClr>
-              <a:buSzPct val="75000"/>
-              <a:buFont typeface="Symbol"/>
-              <a:buChar char=""/>
+              <a:buFont typeface="Arial"/>
+              <a:buChar char="•"/>
             </a:pPr>
             <a:r>
-              <a:rPr b="0" lang="en-US" sz="2000" spc="-1" strike="noStrike">
+              <a:rPr b="0" lang="en-US" sz="2400" spc="-1" strike="noStrike">
                 <a:solidFill>
                   <a:srgbClr val="000000"/>
                 </a:solidFill>
@@ -8996,9 +9478,10 @@
                     <a:srgbClr val="ffffff"/>
                   </a:solidFill>
                 </a:uFill>
-                <a:latin typeface="Arial"/>
+                <a:latin typeface="Calibri"/>
+                <a:ea typeface="DejaVu Sans"/>
               </a:rPr>
-              <a:t>Policy 2: 100 cars in 20 secs 47.5 Avg delay (took 137 sec execution)</a:t>
+              <a:t>Dresner &amp; Stone’s policy</a:t>
             </a:r>
             <a:endParaRPr b="0" lang="en-US" sz="1800" spc="-1" strike="noStrike">
               <a:solidFill>
@@ -9013,19 +9496,18 @@
             </a:endParaRPr>
           </a:p>
           <a:p>
-            <a:pPr lvl="1" marL="864000" indent="-323640">
+            <a:pPr lvl="2" marL="1200240" indent="-285120">
               <a:lnSpc>
                 <a:spcPct val="100000"/>
               </a:lnSpc>
               <a:buClr>
                 <a:srgbClr val="000000"/>
               </a:buClr>
-              <a:buSzPct val="75000"/>
-              <a:buFont typeface="Symbol"/>
-              <a:buChar char=""/>
+              <a:buFont typeface="Arial"/>
+              <a:buChar char="•"/>
             </a:pPr>
             <a:r>
-              <a:rPr b="0" lang="en-US" sz="2000" spc="-1" strike="noStrike">
+              <a:rPr b="0" lang="en-US" sz="2400" spc="-1" strike="noStrike">
                 <a:solidFill>
                   <a:srgbClr val="000000"/>
                 </a:solidFill>
@@ -9034,9 +9516,10 @@
                     <a:srgbClr val="ffffff"/>
                   </a:solidFill>
                 </a:uFill>
-                <a:latin typeface="Arial"/>
+                <a:latin typeface="Calibri"/>
+                <a:ea typeface="DejaVu Sans"/>
               </a:rPr>
-              <a:t>Policy 3: 100 cars in 20 secs 33.7 Avg delay (took 89 sec execution)</a:t>
+              <a:t>Our policy</a:t>
             </a:r>
             <a:endParaRPr b="0" lang="en-US" sz="1800" spc="-1" strike="noStrike">
               <a:solidFill>
@@ -9051,19 +9534,18 @@
             </a:endParaRPr>
           </a:p>
           <a:p>
-            <a:pPr lvl="1" marL="864000" indent="-323640">
+            <a:pPr lvl="1" marL="743040" indent="-285120">
               <a:lnSpc>
                 <a:spcPct val="100000"/>
               </a:lnSpc>
               <a:buClr>
                 <a:srgbClr val="000000"/>
               </a:buClr>
-              <a:buSzPct val="75000"/>
-              <a:buFont typeface="Symbol"/>
-              <a:buChar char=""/>
+              <a:buFont typeface="Arial"/>
+              <a:buChar char="•"/>
             </a:pPr>
             <a:r>
-              <a:rPr b="0" lang="en-US" sz="2000" spc="-1" strike="noStrike">
+              <a:rPr b="0" lang="en-US" sz="2600" spc="-1" strike="noStrike">
                 <a:solidFill>
                   <a:srgbClr val="000000"/>
                 </a:solidFill>
@@ -9072,9 +9554,10 @@
                     <a:srgbClr val="ffffff"/>
                   </a:solidFill>
                 </a:uFill>
-                <a:latin typeface="Arial"/>
+                <a:latin typeface="Calibri"/>
+                <a:ea typeface="DejaVu Sans"/>
               </a:rPr>
-              <a:t> </a:t>
+              <a:t>Our policy should at least provide shorter delays than current Traffic Light and Stop sign systems</a:t>
             </a:r>
             <a:endParaRPr b="0" lang="en-US" sz="1800" spc="-1" strike="noStrike">
               <a:solidFill>
@@ -9089,19 +9572,18 @@
             </a:endParaRPr>
           </a:p>
           <a:p>
-            <a:pPr lvl="1" marL="864000" indent="-323640">
+            <a:pPr lvl="1" marL="743040" indent="-285120">
               <a:lnSpc>
                 <a:spcPct val="100000"/>
               </a:lnSpc>
               <a:buClr>
                 <a:srgbClr val="000000"/>
               </a:buClr>
-              <a:buSzPct val="75000"/>
-              <a:buFont typeface="Symbol"/>
-              <a:buChar char=""/>
+              <a:buFont typeface="Arial"/>
+              <a:buChar char="•"/>
             </a:pPr>
             <a:r>
-              <a:rPr b="0" lang="en-US" sz="2000" spc="-1" strike="noStrike">
+              <a:rPr b="0" lang="en-US" sz="2600" spc="-1" strike="noStrike">
                 <a:solidFill>
                   <a:srgbClr val="000000"/>
                 </a:solidFill>
@@ -9110,9 +9592,10 @@
                     <a:srgbClr val="ffffff"/>
                   </a:solidFill>
                 </a:uFill>
-                <a:latin typeface="Arial"/>
+                <a:latin typeface="Calibri"/>
+                <a:ea typeface="DejaVu Sans"/>
               </a:rPr>
-              <a:t> </a:t>
+              <a:t>Stretch goal: Shorter delay than Dresner &amp; Stone’s policy</a:t>
             </a:r>
             <a:endParaRPr b="0" lang="en-US" sz="1800" spc="-1" strike="noStrike">
               <a:solidFill>
@@ -9127,31 +9610,11 @@
             </a:endParaRPr>
           </a:p>
           <a:p>
-            <a:pPr lvl="1" marL="864000" indent="-323640">
+            <a:pPr>
               <a:lnSpc>
                 <a:spcPct val="100000"/>
               </a:lnSpc>
-              <a:buClr>
-                <a:srgbClr val="000000"/>
-              </a:buClr>
-              <a:buSzPct val="75000"/>
-              <a:buFont typeface="Symbol"/>
-              <a:buChar char=""/>
             </a:pPr>
-            <a:r>
-              <a:rPr b="0" lang="en-US" sz="2000" spc="-1" strike="noStrike">
-                <a:solidFill>
-                  <a:srgbClr val="000000"/>
-                </a:solidFill>
-                <a:uFill>
-                  <a:solidFill>
-                    <a:srgbClr val="ffffff"/>
-                  </a:solidFill>
-                </a:uFill>
-                <a:latin typeface="Arial"/>
-              </a:rPr>
-              <a:t>Note to mention: These execution times include the ACC computation for each vehicle and are not as optimized as can be running on a decent laptop at 0.1s granularity. With a little bit of optimization and more processing power we would like to argue that this can definitely be done in Real Time.</a:t>
-            </a:r>
             <a:endParaRPr b="0" lang="en-US" sz="1800" spc="-1" strike="noStrike">
               <a:solidFill>
                 <a:srgbClr val="000000"/>
@@ -9168,33 +9631,6 @@
       </p:sp>
     </p:spTree>
   </p:cSld>
-  <p:timing>
-    <p:tnLst>
-      <p:par>
-        <p:cTn id="13" dur="indefinite" restart="never" nodeType="tmRoot">
-          <p:childTnLst>
-            <p:seq>
-              <p:cTn id="14" nodeType="mainSeq"/>
-              <p:prevCondLst>
-                <p:cond delay="0" evt="onPrev">
-                  <p:tgtEl>
-                    <p:sldTgt/>
-                  </p:tgtEl>
-                </p:cond>
-              </p:prevCondLst>
-              <p:nextCondLst>
-                <p:cond delay="0" evt="onNext">
-                  <p:tgtEl>
-                    <p:sldTgt/>
-                  </p:tgtEl>
-                </p:cond>
-              </p:nextCondLst>
-            </p:seq>
-          </p:childTnLst>
-        </p:cTn>
-      </p:par>
-    </p:tnLst>
-  </p:timing>
 </p:sld>
 </file>
 
@@ -9223,8 +9659,8 @@
         </p:nvSpPr>
         <p:spPr>
           <a:xfrm>
-            <a:off x="838080" y="365040"/>
-            <a:ext cx="10514520" cy="1324440"/>
+            <a:off x="838080" y="48960"/>
+            <a:ext cx="10514520" cy="1956960"/>
           </a:xfrm>
           <a:prstGeom prst="rect">
             <a:avLst/>
@@ -9256,7 +9692,7 @@
                 <a:latin typeface="Andalus"/>
                 <a:ea typeface="DejaVu Sans"/>
               </a:rPr>
-              <a:t>Extra Video with max number of cars system can handle</a:t>
+              <a:t>Results</a:t>
             </a:r>
             <a:endParaRPr b="0" lang="en-US" sz="1800" spc="-1" strike="noStrike">
               <a:solidFill>
@@ -9280,7 +9716,7 @@
         </p:nvSpPr>
         <p:spPr>
           <a:xfrm>
-            <a:off x="609480" y="1604520"/>
+            <a:off x="640440" y="2057760"/>
             <a:ext cx="10972080" cy="3976920"/>
           </a:xfrm>
           <a:prstGeom prst="rect">
@@ -9298,35 +9734,2075 @@
           <a:fontRef idx="minor"/>
         </p:style>
       </p:sp>
+      <p:graphicFrame>
+        <p:nvGraphicFramePr>
+          <p:cNvPr id="158" name="Table 3"/>
+          <p:cNvGraphicFramePr/>
+          <p:nvPr/>
+        </p:nvGraphicFramePr>
+        <p:xfrm>
+          <a:off x="2558880" y="2374200"/>
+          <a:ext cx="7152480" cy="2528640"/>
+        </p:xfrm>
+        <a:graphic>
+          <a:graphicData uri="http://schemas.openxmlformats.org/drawingml/2006/table">
+            <a:tbl>
+              <a:tblPr/>
+              <a:tblGrid>
+                <a:gridCol w="1021680"/>
+                <a:gridCol w="1021680"/>
+                <a:gridCol w="1021680"/>
+                <a:gridCol w="1021680"/>
+                <a:gridCol w="1021680"/>
+                <a:gridCol w="1021680"/>
+                <a:gridCol w="1022760"/>
+              </a:tblGrid>
+              <a:tr h="505800">
+                <a:tc>
+                  <a:txBody>
+                    <a:bodyPr lIns="90000" rIns="90000" tIns="46800" bIns="46800"/>
+                    <a:p>
+                      <a:pPr algn="ctr"/>
+                      <a:r>
+                        <a:rPr b="0" lang="en-US" sz="1400" spc="-1" strike="noStrike">
+                          <a:solidFill>
+                            <a:srgbClr val="000000"/>
+                          </a:solidFill>
+                          <a:uFill>
+                            <a:solidFill>
+                              <a:srgbClr val="ffffff"/>
+                            </a:solidFill>
+                          </a:uFill>
+                          <a:latin typeface="Arial"/>
+                        </a:rPr>
+                        <a:t>Policy</a:t>
+                      </a:r>
+                      <a:endParaRPr b="0" lang="en-US" sz="1800" spc="-1" strike="noStrike">
+                        <a:solidFill>
+                          <a:srgbClr val="000000"/>
+                        </a:solidFill>
+                        <a:uFill>
+                          <a:solidFill>
+                            <a:srgbClr val="ffffff"/>
+                          </a:solidFill>
+                        </a:uFill>
+                        <a:latin typeface="Arial"/>
+                      </a:endParaRPr>
+                    </a:p>
+                  </a:txBody>
+                  <a:tcPr marL="90000" marR="90000">
+                    <a:lnL w="720">
+                      <a:solidFill>
+                        <a:srgbClr val="ffffff"/>
+                      </a:solidFill>
+                    </a:lnL>
+                    <a:lnR w="720">
+                      <a:solidFill>
+                        <a:srgbClr val="ffffff"/>
+                      </a:solidFill>
+                    </a:lnR>
+                    <a:lnT w="720">
+                      <a:solidFill>
+                        <a:srgbClr val="ffffff"/>
+                      </a:solidFill>
+                    </a:lnT>
+                    <a:lnB w="720">
+                      <a:solidFill>
+                        <a:srgbClr val="ffffff"/>
+                      </a:solidFill>
+                    </a:lnB>
+                    <a:solidFill>
+                      <a:srgbClr val="b3b3b3"/>
+                    </a:solidFill>
+                  </a:tcPr>
+                </a:tc>
+                <a:tc>
+                  <a:txBody>
+                    <a:bodyPr lIns="90000" rIns="90000" tIns="46800" bIns="46800"/>
+                    <a:p>
+                      <a:pPr algn="ctr"/>
+                      <a:r>
+                        <a:rPr b="0" lang="en-US" sz="1400" spc="-1" strike="noStrike">
+                          <a:solidFill>
+                            <a:srgbClr val="000000"/>
+                          </a:solidFill>
+                          <a:uFill>
+                            <a:solidFill>
+                              <a:srgbClr val="ffffff"/>
+                            </a:solidFill>
+                          </a:uFill>
+                          <a:latin typeface="Arial"/>
+                        </a:rPr>
+                        <a:t>20 cars/ 20 sec</a:t>
+                      </a:r>
+                      <a:endParaRPr b="0" lang="en-US" sz="1800" spc="-1" strike="noStrike">
+                        <a:solidFill>
+                          <a:srgbClr val="000000"/>
+                        </a:solidFill>
+                        <a:uFill>
+                          <a:solidFill>
+                            <a:srgbClr val="ffffff"/>
+                          </a:solidFill>
+                        </a:uFill>
+                        <a:latin typeface="Arial"/>
+                      </a:endParaRPr>
+                    </a:p>
+                  </a:txBody>
+                  <a:tcPr marL="90000" marR="90000">
+                    <a:lnL w="720">
+                      <a:solidFill>
+                        <a:srgbClr val="ffffff"/>
+                      </a:solidFill>
+                    </a:lnL>
+                    <a:lnR w="720">
+                      <a:solidFill>
+                        <a:srgbClr val="ffffff"/>
+                      </a:solidFill>
+                    </a:lnR>
+                    <a:lnT w="720">
+                      <a:solidFill>
+                        <a:srgbClr val="ffffff"/>
+                      </a:solidFill>
+                    </a:lnT>
+                    <a:lnB w="720">
+                      <a:solidFill>
+                        <a:srgbClr val="ffffff"/>
+                      </a:solidFill>
+                    </a:lnB>
+                    <a:solidFill>
+                      <a:srgbClr val="b3b3b3"/>
+                    </a:solidFill>
+                  </a:tcPr>
+                </a:tc>
+                <a:tc>
+                  <a:txBody>
+                    <a:bodyPr lIns="90000" rIns="90000" tIns="46800" bIns="46800"/>
+                    <a:p>
+                      <a:pPr algn="ctr"/>
+                      <a:r>
+                        <a:rPr b="0" lang="en-US" sz="1400" spc="-1" strike="noStrike">
+                          <a:solidFill>
+                            <a:srgbClr val="000000"/>
+                          </a:solidFill>
+                          <a:uFill>
+                            <a:solidFill>
+                              <a:srgbClr val="ffffff"/>
+                            </a:solidFill>
+                          </a:uFill>
+                          <a:latin typeface="Arial"/>
+                        </a:rPr>
+                        <a:t>40 cars/ 20 sec</a:t>
+                      </a:r>
+                      <a:endParaRPr b="0" lang="en-US" sz="1800" spc="-1" strike="noStrike">
+                        <a:solidFill>
+                          <a:srgbClr val="000000"/>
+                        </a:solidFill>
+                        <a:uFill>
+                          <a:solidFill>
+                            <a:srgbClr val="ffffff"/>
+                          </a:solidFill>
+                        </a:uFill>
+                        <a:latin typeface="Arial"/>
+                      </a:endParaRPr>
+                    </a:p>
+                  </a:txBody>
+                  <a:tcPr marL="90000" marR="90000">
+                    <a:lnL w="720">
+                      <a:solidFill>
+                        <a:srgbClr val="ffffff"/>
+                      </a:solidFill>
+                    </a:lnL>
+                    <a:lnR w="720">
+                      <a:solidFill>
+                        <a:srgbClr val="ffffff"/>
+                      </a:solidFill>
+                    </a:lnR>
+                    <a:lnT w="720">
+                      <a:solidFill>
+                        <a:srgbClr val="ffffff"/>
+                      </a:solidFill>
+                    </a:lnT>
+                    <a:lnB w="720">
+                      <a:solidFill>
+                        <a:srgbClr val="ffffff"/>
+                      </a:solidFill>
+                    </a:lnB>
+                    <a:solidFill>
+                      <a:srgbClr val="b3b3b3"/>
+                    </a:solidFill>
+                  </a:tcPr>
+                </a:tc>
+                <a:tc>
+                  <a:txBody>
+                    <a:bodyPr lIns="90000" rIns="90000" tIns="46800" bIns="46800"/>
+                    <a:p>
+                      <a:pPr algn="ctr"/>
+                      <a:r>
+                        <a:rPr b="0" lang="en-US" sz="1400" spc="-1" strike="noStrike">
+                          <a:solidFill>
+                            <a:srgbClr val="000000"/>
+                          </a:solidFill>
+                          <a:uFill>
+                            <a:solidFill>
+                              <a:srgbClr val="ffffff"/>
+                            </a:solidFill>
+                          </a:uFill>
+                          <a:latin typeface="Arial"/>
+                        </a:rPr>
+                        <a:t>60 cars/ 20 sec</a:t>
+                      </a:r>
+                      <a:endParaRPr b="0" lang="en-US" sz="1800" spc="-1" strike="noStrike">
+                        <a:solidFill>
+                          <a:srgbClr val="000000"/>
+                        </a:solidFill>
+                        <a:uFill>
+                          <a:solidFill>
+                            <a:srgbClr val="ffffff"/>
+                          </a:solidFill>
+                        </a:uFill>
+                        <a:latin typeface="Arial"/>
+                      </a:endParaRPr>
+                    </a:p>
+                  </a:txBody>
+                  <a:tcPr marL="90000" marR="90000">
+                    <a:lnL w="720">
+                      <a:solidFill>
+                        <a:srgbClr val="ffffff"/>
+                      </a:solidFill>
+                    </a:lnL>
+                    <a:lnR w="720">
+                      <a:solidFill>
+                        <a:srgbClr val="ffffff"/>
+                      </a:solidFill>
+                    </a:lnR>
+                    <a:lnT w="720">
+                      <a:solidFill>
+                        <a:srgbClr val="ffffff"/>
+                      </a:solidFill>
+                    </a:lnT>
+                    <a:lnB w="720">
+                      <a:solidFill>
+                        <a:srgbClr val="ffffff"/>
+                      </a:solidFill>
+                    </a:lnB>
+                    <a:solidFill>
+                      <a:srgbClr val="b3b3b3"/>
+                    </a:solidFill>
+                  </a:tcPr>
+                </a:tc>
+                <a:tc>
+                  <a:txBody>
+                    <a:bodyPr lIns="90000" rIns="90000" tIns="46800" bIns="46800"/>
+                    <a:p>
+                      <a:pPr algn="ctr"/>
+                      <a:r>
+                        <a:rPr b="0" lang="en-US" sz="1400" spc="-1" strike="noStrike">
+                          <a:solidFill>
+                            <a:srgbClr val="000000"/>
+                          </a:solidFill>
+                          <a:uFill>
+                            <a:solidFill>
+                              <a:srgbClr val="ffffff"/>
+                            </a:solidFill>
+                          </a:uFill>
+                          <a:latin typeface="Arial"/>
+                        </a:rPr>
+                        <a:t>80 cars/ 20 sec</a:t>
+                      </a:r>
+                      <a:endParaRPr b="0" lang="en-US" sz="1800" spc="-1" strike="noStrike">
+                        <a:solidFill>
+                          <a:srgbClr val="000000"/>
+                        </a:solidFill>
+                        <a:uFill>
+                          <a:solidFill>
+                            <a:srgbClr val="ffffff"/>
+                          </a:solidFill>
+                        </a:uFill>
+                        <a:latin typeface="Arial"/>
+                      </a:endParaRPr>
+                    </a:p>
+                  </a:txBody>
+                  <a:tcPr marL="90000" marR="90000">
+                    <a:lnL w="720">
+                      <a:solidFill>
+                        <a:srgbClr val="ffffff"/>
+                      </a:solidFill>
+                    </a:lnL>
+                    <a:lnR w="720">
+                      <a:solidFill>
+                        <a:srgbClr val="ffffff"/>
+                      </a:solidFill>
+                    </a:lnR>
+                    <a:lnT w="720">
+                      <a:solidFill>
+                        <a:srgbClr val="ffffff"/>
+                      </a:solidFill>
+                    </a:lnT>
+                    <a:lnB w="720">
+                      <a:solidFill>
+                        <a:srgbClr val="ffffff"/>
+                      </a:solidFill>
+                    </a:lnB>
+                    <a:solidFill>
+                      <a:srgbClr val="b3b3b3"/>
+                    </a:solidFill>
+                  </a:tcPr>
+                </a:tc>
+                <a:tc>
+                  <a:txBody>
+                    <a:bodyPr lIns="90000" rIns="90000" tIns="46800" bIns="46800"/>
+                    <a:p>
+                      <a:pPr algn="ctr"/>
+                      <a:r>
+                        <a:rPr b="0" lang="en-US" sz="1400" spc="-1" strike="noStrike">
+                          <a:solidFill>
+                            <a:srgbClr val="000000"/>
+                          </a:solidFill>
+                          <a:uFill>
+                            <a:solidFill>
+                              <a:srgbClr val="ffffff"/>
+                            </a:solidFill>
+                          </a:uFill>
+                          <a:latin typeface="Arial"/>
+                        </a:rPr>
+                        <a:t>100 cars/ 20 sec</a:t>
+                      </a:r>
+                      <a:endParaRPr b="0" lang="en-US" sz="1800" spc="-1" strike="noStrike">
+                        <a:solidFill>
+                          <a:srgbClr val="000000"/>
+                        </a:solidFill>
+                        <a:uFill>
+                          <a:solidFill>
+                            <a:srgbClr val="ffffff"/>
+                          </a:solidFill>
+                        </a:uFill>
+                        <a:latin typeface="Arial"/>
+                      </a:endParaRPr>
+                    </a:p>
+                  </a:txBody>
+                  <a:tcPr marL="90000" marR="90000">
+                    <a:lnL w="720">
+                      <a:solidFill>
+                        <a:srgbClr val="ffffff"/>
+                      </a:solidFill>
+                    </a:lnL>
+                    <a:lnR w="720">
+                      <a:solidFill>
+                        <a:srgbClr val="ffffff"/>
+                      </a:solidFill>
+                    </a:lnR>
+                    <a:lnT w="720">
+                      <a:solidFill>
+                        <a:srgbClr val="ffffff"/>
+                      </a:solidFill>
+                    </a:lnT>
+                    <a:lnB w="720">
+                      <a:solidFill>
+                        <a:srgbClr val="ffffff"/>
+                      </a:solidFill>
+                    </a:lnB>
+                    <a:solidFill>
+                      <a:srgbClr val="b3b3b3"/>
+                    </a:solidFill>
+                  </a:tcPr>
+                </a:tc>
+                <a:tc>
+                  <a:txBody>
+                    <a:bodyPr lIns="90000" rIns="90000" tIns="46800" bIns="46800"/>
+                    <a:p>
+                      <a:pPr algn="ctr"/>
+                      <a:r>
+                        <a:rPr b="0" lang="en-US" sz="1400" spc="-1" strike="noStrike">
+                          <a:solidFill>
+                            <a:srgbClr val="000000"/>
+                          </a:solidFill>
+                          <a:uFill>
+                            <a:solidFill>
+                              <a:srgbClr val="ffffff"/>
+                            </a:solidFill>
+                          </a:uFill>
+                          <a:latin typeface="Arial"/>
+                        </a:rPr>
+                        <a:t>120 cars/ 20 sec</a:t>
+                      </a:r>
+                      <a:endParaRPr b="0" lang="en-US" sz="1800" spc="-1" strike="noStrike">
+                        <a:solidFill>
+                          <a:srgbClr val="000000"/>
+                        </a:solidFill>
+                        <a:uFill>
+                          <a:solidFill>
+                            <a:srgbClr val="ffffff"/>
+                          </a:solidFill>
+                        </a:uFill>
+                        <a:latin typeface="Arial"/>
+                      </a:endParaRPr>
+                    </a:p>
+                  </a:txBody>
+                  <a:tcPr marL="90000" marR="90000">
+                    <a:lnL w="720">
+                      <a:solidFill>
+                        <a:srgbClr val="ffffff"/>
+                      </a:solidFill>
+                    </a:lnL>
+                    <a:lnR w="720">
+                      <a:solidFill>
+                        <a:srgbClr val="ffffff"/>
+                      </a:solidFill>
+                    </a:lnR>
+                    <a:lnT w="720">
+                      <a:solidFill>
+                        <a:srgbClr val="ffffff"/>
+                      </a:solidFill>
+                    </a:lnT>
+                    <a:lnB w="720">
+                      <a:solidFill>
+                        <a:srgbClr val="ffffff"/>
+                      </a:solidFill>
+                    </a:lnB>
+                    <a:solidFill>
+                      <a:srgbClr val="b3b3b3"/>
+                    </a:solidFill>
+                  </a:tcPr>
+                </a:tc>
+              </a:tr>
+              <a:tr h="505800">
+                <a:tc>
+                  <a:txBody>
+                    <a:bodyPr lIns="90000" rIns="90000" tIns="46800" bIns="46800"/>
+                    <a:p>
+                      <a:pPr algn="ctr"/>
+                      <a:r>
+                        <a:rPr b="0" lang="en-US" sz="1400" spc="-1" strike="noStrike">
+                          <a:solidFill>
+                            <a:srgbClr val="000000"/>
+                          </a:solidFill>
+                          <a:uFill>
+                            <a:solidFill>
+                              <a:srgbClr val="ffffff"/>
+                            </a:solidFill>
+                          </a:uFill>
+                          <a:latin typeface="Arial"/>
+                        </a:rPr>
+                        <a:t>Ours</a:t>
+                      </a:r>
+                      <a:endParaRPr b="0" lang="en-US" sz="1800" spc="-1" strike="noStrike">
+                        <a:solidFill>
+                          <a:srgbClr val="000000"/>
+                        </a:solidFill>
+                        <a:uFill>
+                          <a:solidFill>
+                            <a:srgbClr val="ffffff"/>
+                          </a:solidFill>
+                        </a:uFill>
+                        <a:latin typeface="Arial"/>
+                      </a:endParaRPr>
+                    </a:p>
+                  </a:txBody>
+                  <a:tcPr marL="90000" marR="90000">
+                    <a:lnL w="720">
+                      <a:solidFill>
+                        <a:srgbClr val="ffffff"/>
+                      </a:solidFill>
+                    </a:lnL>
+                    <a:lnR w="720">
+                      <a:solidFill>
+                        <a:srgbClr val="ffffff"/>
+                      </a:solidFill>
+                    </a:lnR>
+                    <a:lnT w="720">
+                      <a:solidFill>
+                        <a:srgbClr val="ffffff"/>
+                      </a:solidFill>
+                    </a:lnT>
+                    <a:lnB w="720">
+                      <a:solidFill>
+                        <a:srgbClr val="ffffff"/>
+                      </a:solidFill>
+                    </a:lnB>
+                    <a:solidFill>
+                      <a:srgbClr val="cccccc"/>
+                    </a:solidFill>
+                  </a:tcPr>
+                </a:tc>
+                <a:tc>
+                  <a:txBody>
+                    <a:bodyPr lIns="90000" rIns="90000" tIns="46800" bIns="46800"/>
+                    <a:p>
+                      <a:pPr algn="ctr"/>
+                      <a:r>
+                        <a:rPr b="0" lang="en-US" sz="1400" spc="-1" strike="noStrike">
+                          <a:solidFill>
+                            <a:srgbClr val="000000"/>
+                          </a:solidFill>
+                          <a:uFill>
+                            <a:solidFill>
+                              <a:srgbClr val="ffffff"/>
+                            </a:solidFill>
+                          </a:uFill>
+                          <a:latin typeface="Arial"/>
+                        </a:rPr>
+                        <a:t>0.031</a:t>
+                      </a:r>
+                      <a:endParaRPr b="0" lang="en-US" sz="1800" spc="-1" strike="noStrike">
+                        <a:solidFill>
+                          <a:srgbClr val="000000"/>
+                        </a:solidFill>
+                        <a:uFill>
+                          <a:solidFill>
+                            <a:srgbClr val="ffffff"/>
+                          </a:solidFill>
+                        </a:uFill>
+                        <a:latin typeface="Arial"/>
+                      </a:endParaRPr>
+                    </a:p>
+                  </a:txBody>
+                  <a:tcPr marL="90000" marR="90000">
+                    <a:lnL w="720">
+                      <a:solidFill>
+                        <a:srgbClr val="ffffff"/>
+                      </a:solidFill>
+                    </a:lnL>
+                    <a:lnR w="720">
+                      <a:solidFill>
+                        <a:srgbClr val="ffffff"/>
+                      </a:solidFill>
+                    </a:lnR>
+                    <a:lnT w="720">
+                      <a:solidFill>
+                        <a:srgbClr val="ffffff"/>
+                      </a:solidFill>
+                    </a:lnT>
+                    <a:lnB w="720">
+                      <a:solidFill>
+                        <a:srgbClr val="ffffff"/>
+                      </a:solidFill>
+                    </a:lnB>
+                    <a:solidFill>
+                      <a:srgbClr val="cccccc"/>
+                    </a:solidFill>
+                  </a:tcPr>
+                </a:tc>
+                <a:tc>
+                  <a:txBody>
+                    <a:bodyPr lIns="90000" rIns="90000" tIns="46800" bIns="46800"/>
+                    <a:p>
+                      <a:pPr algn="ctr"/>
+                      <a:r>
+                        <a:rPr b="0" lang="en-US" sz="1400" spc="-1" strike="noStrike">
+                          <a:solidFill>
+                            <a:srgbClr val="000000"/>
+                          </a:solidFill>
+                          <a:uFill>
+                            <a:solidFill>
+                              <a:srgbClr val="ffffff"/>
+                            </a:solidFill>
+                          </a:uFill>
+                          <a:latin typeface="Arial"/>
+                        </a:rPr>
+                        <a:t>0.068</a:t>
+                      </a:r>
+                      <a:endParaRPr b="0" lang="en-US" sz="1800" spc="-1" strike="noStrike">
+                        <a:solidFill>
+                          <a:srgbClr val="000000"/>
+                        </a:solidFill>
+                        <a:uFill>
+                          <a:solidFill>
+                            <a:srgbClr val="ffffff"/>
+                          </a:solidFill>
+                        </a:uFill>
+                        <a:latin typeface="Arial"/>
+                      </a:endParaRPr>
+                    </a:p>
+                  </a:txBody>
+                  <a:tcPr marL="90000" marR="90000">
+                    <a:lnL w="720">
+                      <a:solidFill>
+                        <a:srgbClr val="ffffff"/>
+                      </a:solidFill>
+                    </a:lnL>
+                    <a:lnR w="720">
+                      <a:solidFill>
+                        <a:srgbClr val="ffffff"/>
+                      </a:solidFill>
+                    </a:lnR>
+                    <a:lnT w="720">
+                      <a:solidFill>
+                        <a:srgbClr val="ffffff"/>
+                      </a:solidFill>
+                    </a:lnT>
+                    <a:lnB w="720">
+                      <a:solidFill>
+                        <a:srgbClr val="ffffff"/>
+                      </a:solidFill>
+                    </a:lnB>
+                    <a:solidFill>
+                      <a:srgbClr val="cccccc"/>
+                    </a:solidFill>
+                  </a:tcPr>
+                </a:tc>
+                <a:tc>
+                  <a:txBody>
+                    <a:bodyPr lIns="90000" rIns="90000" tIns="46800" bIns="46800"/>
+                    <a:p>
+                      <a:pPr algn="ctr"/>
+                      <a:r>
+                        <a:rPr b="0" lang="en-US" sz="1400" spc="-1" strike="noStrike">
+                          <a:solidFill>
+                            <a:srgbClr val="000000"/>
+                          </a:solidFill>
+                          <a:uFill>
+                            <a:solidFill>
+                              <a:srgbClr val="ffffff"/>
+                            </a:solidFill>
+                          </a:uFill>
+                          <a:latin typeface="Arial"/>
+                        </a:rPr>
+                        <a:t>0.084</a:t>
+                      </a:r>
+                      <a:endParaRPr b="0" lang="en-US" sz="1800" spc="-1" strike="noStrike">
+                        <a:solidFill>
+                          <a:srgbClr val="000000"/>
+                        </a:solidFill>
+                        <a:uFill>
+                          <a:solidFill>
+                            <a:srgbClr val="ffffff"/>
+                          </a:solidFill>
+                        </a:uFill>
+                        <a:latin typeface="Arial"/>
+                      </a:endParaRPr>
+                    </a:p>
+                  </a:txBody>
+                  <a:tcPr marL="90000" marR="90000">
+                    <a:lnL w="720">
+                      <a:solidFill>
+                        <a:srgbClr val="ffffff"/>
+                      </a:solidFill>
+                    </a:lnL>
+                    <a:lnR w="720">
+                      <a:solidFill>
+                        <a:srgbClr val="ffffff"/>
+                      </a:solidFill>
+                    </a:lnR>
+                    <a:lnT w="720">
+                      <a:solidFill>
+                        <a:srgbClr val="ffffff"/>
+                      </a:solidFill>
+                    </a:lnT>
+                    <a:lnB w="720">
+                      <a:solidFill>
+                        <a:srgbClr val="ffffff"/>
+                      </a:solidFill>
+                    </a:lnB>
+                    <a:solidFill>
+                      <a:srgbClr val="cccccc"/>
+                    </a:solidFill>
+                  </a:tcPr>
+                </a:tc>
+                <a:tc>
+                  <a:txBody>
+                    <a:bodyPr lIns="90000" rIns="90000" tIns="46800" bIns="46800"/>
+                    <a:p>
+                      <a:pPr algn="ctr"/>
+                      <a:r>
+                        <a:rPr b="0" lang="en-US" sz="1400" spc="-1" strike="noStrike">
+                          <a:solidFill>
+                            <a:srgbClr val="000000"/>
+                          </a:solidFill>
+                          <a:uFill>
+                            <a:solidFill>
+                              <a:srgbClr val="ffffff"/>
+                            </a:solidFill>
+                          </a:uFill>
+                          <a:latin typeface="Arial"/>
+                        </a:rPr>
+                        <a:t>0.206</a:t>
+                      </a:r>
+                      <a:endParaRPr b="0" lang="en-US" sz="1800" spc="-1" strike="noStrike">
+                        <a:solidFill>
+                          <a:srgbClr val="000000"/>
+                        </a:solidFill>
+                        <a:uFill>
+                          <a:solidFill>
+                            <a:srgbClr val="ffffff"/>
+                          </a:solidFill>
+                        </a:uFill>
+                        <a:latin typeface="Arial"/>
+                      </a:endParaRPr>
+                    </a:p>
+                  </a:txBody>
+                  <a:tcPr marL="90000" marR="90000">
+                    <a:lnL w="720">
+                      <a:solidFill>
+                        <a:srgbClr val="ffffff"/>
+                      </a:solidFill>
+                    </a:lnL>
+                    <a:lnR w="720">
+                      <a:solidFill>
+                        <a:srgbClr val="ffffff"/>
+                      </a:solidFill>
+                    </a:lnR>
+                    <a:lnT w="720">
+                      <a:solidFill>
+                        <a:srgbClr val="ffffff"/>
+                      </a:solidFill>
+                    </a:lnT>
+                    <a:lnB w="720">
+                      <a:solidFill>
+                        <a:srgbClr val="ffffff"/>
+                      </a:solidFill>
+                    </a:lnB>
+                    <a:solidFill>
+                      <a:srgbClr val="cccccc"/>
+                    </a:solidFill>
+                  </a:tcPr>
+                </a:tc>
+                <a:tc>
+                  <a:txBody>
+                    <a:bodyPr lIns="90000" rIns="90000" tIns="46800" bIns="46800"/>
+                    <a:p>
+                      <a:pPr algn="ctr"/>
+                      <a:r>
+                        <a:rPr b="0" lang="en-US" sz="1400" spc="-1" strike="noStrike">
+                          <a:solidFill>
+                            <a:srgbClr val="000000"/>
+                          </a:solidFill>
+                          <a:uFill>
+                            <a:solidFill>
+                              <a:srgbClr val="ffffff"/>
+                            </a:solidFill>
+                          </a:uFill>
+                          <a:latin typeface="Arial"/>
+                        </a:rPr>
+                        <a:t>0.326</a:t>
+                      </a:r>
+                      <a:endParaRPr b="0" lang="en-US" sz="1800" spc="-1" strike="noStrike">
+                        <a:solidFill>
+                          <a:srgbClr val="000000"/>
+                        </a:solidFill>
+                        <a:uFill>
+                          <a:solidFill>
+                            <a:srgbClr val="ffffff"/>
+                          </a:solidFill>
+                        </a:uFill>
+                        <a:latin typeface="Arial"/>
+                      </a:endParaRPr>
+                    </a:p>
+                  </a:txBody>
+                  <a:tcPr marL="90000" marR="90000">
+                    <a:lnL w="720">
+                      <a:solidFill>
+                        <a:srgbClr val="ffffff"/>
+                      </a:solidFill>
+                    </a:lnL>
+                    <a:lnR w="720">
+                      <a:solidFill>
+                        <a:srgbClr val="ffffff"/>
+                      </a:solidFill>
+                    </a:lnR>
+                    <a:lnT w="720">
+                      <a:solidFill>
+                        <a:srgbClr val="ffffff"/>
+                      </a:solidFill>
+                    </a:lnT>
+                    <a:lnB w="720">
+                      <a:solidFill>
+                        <a:srgbClr val="ffffff"/>
+                      </a:solidFill>
+                    </a:lnB>
+                    <a:solidFill>
+                      <a:srgbClr val="cccccc"/>
+                    </a:solidFill>
+                  </a:tcPr>
+                </a:tc>
+                <a:tc>
+                  <a:txBody>
+                    <a:bodyPr lIns="90000" rIns="90000" tIns="46800" bIns="46800"/>
+                    <a:p>
+                      <a:pPr algn="ctr"/>
+                      <a:r>
+                        <a:rPr b="0" lang="en-US" sz="1400" spc="-1" strike="noStrike">
+                          <a:solidFill>
+                            <a:srgbClr val="000000"/>
+                          </a:solidFill>
+                          <a:uFill>
+                            <a:solidFill>
+                              <a:srgbClr val="ffffff"/>
+                            </a:solidFill>
+                          </a:uFill>
+                          <a:latin typeface="Arial"/>
+                        </a:rPr>
+                        <a:t>1.957</a:t>
+                      </a:r>
+                      <a:endParaRPr b="0" lang="en-US" sz="1800" spc="-1" strike="noStrike">
+                        <a:solidFill>
+                          <a:srgbClr val="000000"/>
+                        </a:solidFill>
+                        <a:uFill>
+                          <a:solidFill>
+                            <a:srgbClr val="ffffff"/>
+                          </a:solidFill>
+                        </a:uFill>
+                        <a:latin typeface="Arial"/>
+                      </a:endParaRPr>
+                    </a:p>
+                  </a:txBody>
+                  <a:tcPr marL="90000" marR="90000">
+                    <a:lnL w="720">
+                      <a:solidFill>
+                        <a:srgbClr val="ffffff"/>
+                      </a:solidFill>
+                    </a:lnL>
+                    <a:lnR w="720">
+                      <a:solidFill>
+                        <a:srgbClr val="ffffff"/>
+                      </a:solidFill>
+                    </a:lnR>
+                    <a:lnT w="720">
+                      <a:solidFill>
+                        <a:srgbClr val="ffffff"/>
+                      </a:solidFill>
+                    </a:lnT>
+                    <a:lnB w="720">
+                      <a:solidFill>
+                        <a:srgbClr val="ffffff"/>
+                      </a:solidFill>
+                    </a:lnB>
+                    <a:solidFill>
+                      <a:srgbClr val="cccccc"/>
+                    </a:solidFill>
+                  </a:tcPr>
+                </a:tc>
+              </a:tr>
+              <a:tr h="505800">
+                <a:tc>
+                  <a:txBody>
+                    <a:bodyPr lIns="90000" rIns="90000" tIns="46800" bIns="46800"/>
+                    <a:p>
+                      <a:pPr algn="ctr"/>
+                      <a:r>
+                        <a:rPr b="0" lang="en-US" sz="1400" spc="-1" strike="noStrike">
+                          <a:solidFill>
+                            <a:srgbClr val="000000"/>
+                          </a:solidFill>
+                          <a:uFill>
+                            <a:solidFill>
+                              <a:srgbClr val="ffffff"/>
+                            </a:solidFill>
+                          </a:uFill>
+                          <a:latin typeface="Arial"/>
+                        </a:rPr>
+                        <a:t>Dresner/Stone</a:t>
+                      </a:r>
+                      <a:endParaRPr b="0" lang="en-US" sz="1800" spc="-1" strike="noStrike">
+                        <a:solidFill>
+                          <a:srgbClr val="000000"/>
+                        </a:solidFill>
+                        <a:uFill>
+                          <a:solidFill>
+                            <a:srgbClr val="ffffff"/>
+                          </a:solidFill>
+                        </a:uFill>
+                        <a:latin typeface="Arial"/>
+                      </a:endParaRPr>
+                    </a:p>
+                  </a:txBody>
+                  <a:tcPr marL="90000" marR="90000">
+                    <a:lnL w="720">
+                      <a:solidFill>
+                        <a:srgbClr val="ffffff"/>
+                      </a:solidFill>
+                    </a:lnL>
+                    <a:lnR w="720">
+                      <a:solidFill>
+                        <a:srgbClr val="ffffff"/>
+                      </a:solidFill>
+                    </a:lnR>
+                    <a:lnT w="720">
+                      <a:solidFill>
+                        <a:srgbClr val="ffffff"/>
+                      </a:solidFill>
+                    </a:lnT>
+                    <a:lnB w="720">
+                      <a:solidFill>
+                        <a:srgbClr val="ffffff"/>
+                      </a:solidFill>
+                    </a:lnB>
+                    <a:solidFill>
+                      <a:srgbClr val="e6e6e6"/>
+                    </a:solidFill>
+                  </a:tcPr>
+                </a:tc>
+                <a:tc>
+                  <a:txBody>
+                    <a:bodyPr lIns="90000" rIns="90000" tIns="46800" bIns="46800"/>
+                    <a:p>
+                      <a:pPr algn="ctr"/>
+                      <a:r>
+                        <a:rPr b="0" lang="en-US" sz="1400" spc="-1" strike="noStrike">
+                          <a:solidFill>
+                            <a:srgbClr val="000000"/>
+                          </a:solidFill>
+                          <a:uFill>
+                            <a:solidFill>
+                              <a:srgbClr val="ffffff"/>
+                            </a:solidFill>
+                          </a:uFill>
+                          <a:latin typeface="Arial"/>
+                        </a:rPr>
+                        <a:t>0.026</a:t>
+                      </a:r>
+                      <a:endParaRPr b="0" lang="en-US" sz="1800" spc="-1" strike="noStrike">
+                        <a:solidFill>
+                          <a:srgbClr val="000000"/>
+                        </a:solidFill>
+                        <a:uFill>
+                          <a:solidFill>
+                            <a:srgbClr val="ffffff"/>
+                          </a:solidFill>
+                        </a:uFill>
+                        <a:latin typeface="Arial"/>
+                      </a:endParaRPr>
+                    </a:p>
+                  </a:txBody>
+                  <a:tcPr marL="90000" marR="90000">
+                    <a:lnL w="720">
+                      <a:solidFill>
+                        <a:srgbClr val="ffffff"/>
+                      </a:solidFill>
+                    </a:lnL>
+                    <a:lnR w="720">
+                      <a:solidFill>
+                        <a:srgbClr val="ffffff"/>
+                      </a:solidFill>
+                    </a:lnR>
+                    <a:lnT w="720">
+                      <a:solidFill>
+                        <a:srgbClr val="ffffff"/>
+                      </a:solidFill>
+                    </a:lnT>
+                    <a:lnB w="720">
+                      <a:solidFill>
+                        <a:srgbClr val="ffffff"/>
+                      </a:solidFill>
+                    </a:lnB>
+                    <a:solidFill>
+                      <a:srgbClr val="e6e6e6"/>
+                    </a:solidFill>
+                  </a:tcPr>
+                </a:tc>
+                <a:tc>
+                  <a:txBody>
+                    <a:bodyPr lIns="90000" rIns="90000" tIns="46800" bIns="46800"/>
+                    <a:p>
+                      <a:pPr algn="ctr"/>
+                      <a:r>
+                        <a:rPr b="0" lang="en-US" sz="1400" spc="-1" strike="noStrike">
+                          <a:solidFill>
+                            <a:srgbClr val="000000"/>
+                          </a:solidFill>
+                          <a:uFill>
+                            <a:solidFill>
+                              <a:srgbClr val="ffffff"/>
+                            </a:solidFill>
+                          </a:uFill>
+                          <a:latin typeface="Arial"/>
+                        </a:rPr>
+                        <a:t>0.057</a:t>
+                      </a:r>
+                      <a:endParaRPr b="0" lang="en-US" sz="1800" spc="-1" strike="noStrike">
+                        <a:solidFill>
+                          <a:srgbClr val="000000"/>
+                        </a:solidFill>
+                        <a:uFill>
+                          <a:solidFill>
+                            <a:srgbClr val="ffffff"/>
+                          </a:solidFill>
+                        </a:uFill>
+                        <a:latin typeface="Arial"/>
+                      </a:endParaRPr>
+                    </a:p>
+                  </a:txBody>
+                  <a:tcPr marL="90000" marR="90000">
+                    <a:lnL w="720">
+                      <a:solidFill>
+                        <a:srgbClr val="ffffff"/>
+                      </a:solidFill>
+                    </a:lnL>
+                    <a:lnR w="720">
+                      <a:solidFill>
+                        <a:srgbClr val="ffffff"/>
+                      </a:solidFill>
+                    </a:lnR>
+                    <a:lnT w="720">
+                      <a:solidFill>
+                        <a:srgbClr val="ffffff"/>
+                      </a:solidFill>
+                    </a:lnT>
+                    <a:lnB w="720">
+                      <a:solidFill>
+                        <a:srgbClr val="ffffff"/>
+                      </a:solidFill>
+                    </a:lnB>
+                    <a:solidFill>
+                      <a:srgbClr val="e6e6e6"/>
+                    </a:solidFill>
+                  </a:tcPr>
+                </a:tc>
+                <a:tc>
+                  <a:txBody>
+                    <a:bodyPr lIns="90000" rIns="90000" tIns="46800" bIns="46800"/>
+                    <a:p>
+                      <a:pPr algn="ctr"/>
+                      <a:r>
+                        <a:rPr b="0" lang="en-US" sz="1400" spc="-1" strike="noStrike">
+                          <a:solidFill>
+                            <a:srgbClr val="000000"/>
+                          </a:solidFill>
+                          <a:uFill>
+                            <a:solidFill>
+                              <a:srgbClr val="ffffff"/>
+                            </a:solidFill>
+                          </a:uFill>
+                          <a:latin typeface="Arial"/>
+                        </a:rPr>
+                        <a:t>0.105</a:t>
+                      </a:r>
+                      <a:endParaRPr b="0" lang="en-US" sz="1800" spc="-1" strike="noStrike">
+                        <a:solidFill>
+                          <a:srgbClr val="000000"/>
+                        </a:solidFill>
+                        <a:uFill>
+                          <a:solidFill>
+                            <a:srgbClr val="ffffff"/>
+                          </a:solidFill>
+                        </a:uFill>
+                        <a:latin typeface="Arial"/>
+                      </a:endParaRPr>
+                    </a:p>
+                  </a:txBody>
+                  <a:tcPr marL="90000" marR="90000">
+                    <a:lnL w="720">
+                      <a:solidFill>
+                        <a:srgbClr val="ffffff"/>
+                      </a:solidFill>
+                    </a:lnL>
+                    <a:lnR w="720">
+                      <a:solidFill>
+                        <a:srgbClr val="ffffff"/>
+                      </a:solidFill>
+                    </a:lnR>
+                    <a:lnT w="720">
+                      <a:solidFill>
+                        <a:srgbClr val="ffffff"/>
+                      </a:solidFill>
+                    </a:lnT>
+                    <a:lnB w="720">
+                      <a:solidFill>
+                        <a:srgbClr val="ffffff"/>
+                      </a:solidFill>
+                    </a:lnB>
+                    <a:solidFill>
+                      <a:srgbClr val="e6e6e6"/>
+                    </a:solidFill>
+                  </a:tcPr>
+                </a:tc>
+                <a:tc>
+                  <a:txBody>
+                    <a:bodyPr lIns="90000" rIns="90000" tIns="46800" bIns="46800"/>
+                    <a:p>
+                      <a:pPr algn="ctr"/>
+                      <a:r>
+                        <a:rPr b="0" lang="en-US" sz="1400" spc="-1" strike="noStrike">
+                          <a:solidFill>
+                            <a:srgbClr val="000000"/>
+                          </a:solidFill>
+                          <a:uFill>
+                            <a:solidFill>
+                              <a:srgbClr val="ffffff"/>
+                            </a:solidFill>
+                          </a:uFill>
+                          <a:latin typeface="Arial"/>
+                        </a:rPr>
+                        <a:t>0.575</a:t>
+                      </a:r>
+                      <a:endParaRPr b="0" lang="en-US" sz="1800" spc="-1" strike="noStrike">
+                        <a:solidFill>
+                          <a:srgbClr val="000000"/>
+                        </a:solidFill>
+                        <a:uFill>
+                          <a:solidFill>
+                            <a:srgbClr val="ffffff"/>
+                          </a:solidFill>
+                        </a:uFill>
+                        <a:latin typeface="Arial"/>
+                      </a:endParaRPr>
+                    </a:p>
+                  </a:txBody>
+                  <a:tcPr marL="90000" marR="90000">
+                    <a:lnL w="720">
+                      <a:solidFill>
+                        <a:srgbClr val="ffffff"/>
+                      </a:solidFill>
+                    </a:lnL>
+                    <a:lnR w="720">
+                      <a:solidFill>
+                        <a:srgbClr val="ffffff"/>
+                      </a:solidFill>
+                    </a:lnR>
+                    <a:lnT w="720">
+                      <a:solidFill>
+                        <a:srgbClr val="ffffff"/>
+                      </a:solidFill>
+                    </a:lnT>
+                    <a:lnB w="720">
+                      <a:solidFill>
+                        <a:srgbClr val="ffffff"/>
+                      </a:solidFill>
+                    </a:lnB>
+                    <a:solidFill>
+                      <a:srgbClr val="e6e6e6"/>
+                    </a:solidFill>
+                  </a:tcPr>
+                </a:tc>
+                <a:tc>
+                  <a:txBody>
+                    <a:bodyPr lIns="90000" rIns="90000" tIns="46800" bIns="46800"/>
+                    <a:p>
+                      <a:pPr algn="ctr"/>
+                      <a:r>
+                        <a:rPr b="0" lang="en-US" sz="1400" spc="-1" strike="noStrike">
+                          <a:solidFill>
+                            <a:srgbClr val="000000"/>
+                          </a:solidFill>
+                          <a:uFill>
+                            <a:solidFill>
+                              <a:srgbClr val="ffffff"/>
+                            </a:solidFill>
+                          </a:uFill>
+                          <a:latin typeface="Arial"/>
+                        </a:rPr>
+                        <a:t>0.667</a:t>
+                      </a:r>
+                      <a:endParaRPr b="0" lang="en-US" sz="1800" spc="-1" strike="noStrike">
+                        <a:solidFill>
+                          <a:srgbClr val="000000"/>
+                        </a:solidFill>
+                        <a:uFill>
+                          <a:solidFill>
+                            <a:srgbClr val="ffffff"/>
+                          </a:solidFill>
+                        </a:uFill>
+                        <a:latin typeface="Arial"/>
+                      </a:endParaRPr>
+                    </a:p>
+                  </a:txBody>
+                  <a:tcPr marL="90000" marR="90000">
+                    <a:lnL w="720">
+                      <a:solidFill>
+                        <a:srgbClr val="ffffff"/>
+                      </a:solidFill>
+                    </a:lnL>
+                    <a:lnR w="720">
+                      <a:solidFill>
+                        <a:srgbClr val="ffffff"/>
+                      </a:solidFill>
+                    </a:lnR>
+                    <a:lnT w="720">
+                      <a:solidFill>
+                        <a:srgbClr val="ffffff"/>
+                      </a:solidFill>
+                    </a:lnT>
+                    <a:lnB w="720">
+                      <a:solidFill>
+                        <a:srgbClr val="ffffff"/>
+                      </a:solidFill>
+                    </a:lnB>
+                    <a:solidFill>
+                      <a:srgbClr val="e6e6e6"/>
+                    </a:solidFill>
+                  </a:tcPr>
+                </a:tc>
+                <a:tc>
+                  <a:txBody>
+                    <a:bodyPr lIns="90000" rIns="90000" tIns="46800" bIns="46800"/>
+                    <a:p>
+                      <a:pPr algn="ctr"/>
+                      <a:r>
+                        <a:rPr b="0" lang="en-US" sz="1400" spc="-1" strike="noStrike">
+                          <a:solidFill>
+                            <a:srgbClr val="000000"/>
+                          </a:solidFill>
+                          <a:uFill>
+                            <a:solidFill>
+                              <a:srgbClr val="ffffff"/>
+                            </a:solidFill>
+                          </a:uFill>
+                          <a:latin typeface="Arial"/>
+                        </a:rPr>
+                        <a:t>2.898</a:t>
+                      </a:r>
+                      <a:endParaRPr b="0" lang="en-US" sz="1800" spc="-1" strike="noStrike">
+                        <a:solidFill>
+                          <a:srgbClr val="000000"/>
+                        </a:solidFill>
+                        <a:uFill>
+                          <a:solidFill>
+                            <a:srgbClr val="ffffff"/>
+                          </a:solidFill>
+                        </a:uFill>
+                        <a:latin typeface="Arial"/>
+                      </a:endParaRPr>
+                    </a:p>
+                  </a:txBody>
+                  <a:tcPr marL="90000" marR="90000">
+                    <a:lnL w="720">
+                      <a:solidFill>
+                        <a:srgbClr val="ffffff"/>
+                      </a:solidFill>
+                    </a:lnL>
+                    <a:lnR w="720">
+                      <a:solidFill>
+                        <a:srgbClr val="ffffff"/>
+                      </a:solidFill>
+                    </a:lnR>
+                    <a:lnT w="720">
+                      <a:solidFill>
+                        <a:srgbClr val="ffffff"/>
+                      </a:solidFill>
+                    </a:lnT>
+                    <a:lnB w="720">
+                      <a:solidFill>
+                        <a:srgbClr val="ffffff"/>
+                      </a:solidFill>
+                    </a:lnB>
+                    <a:solidFill>
+                      <a:srgbClr val="e6e6e6"/>
+                    </a:solidFill>
+                  </a:tcPr>
+                </a:tc>
+              </a:tr>
+              <a:tr h="505800">
+                <a:tc>
+                  <a:txBody>
+                    <a:bodyPr lIns="90000" rIns="90000" tIns="46800" bIns="46800"/>
+                    <a:p>
+                      <a:pPr algn="ctr"/>
+                      <a:r>
+                        <a:rPr b="0" lang="en-US" sz="1400" spc="-1" strike="noStrike">
+                          <a:solidFill>
+                            <a:srgbClr val="000000"/>
+                          </a:solidFill>
+                          <a:uFill>
+                            <a:solidFill>
+                              <a:srgbClr val="ffffff"/>
+                            </a:solidFill>
+                          </a:uFill>
+                          <a:latin typeface="Arial"/>
+                        </a:rPr>
+                        <a:t>Traffic Light</a:t>
+                      </a:r>
+                      <a:endParaRPr b="0" lang="en-US" sz="1800" spc="-1" strike="noStrike">
+                        <a:solidFill>
+                          <a:srgbClr val="000000"/>
+                        </a:solidFill>
+                        <a:uFill>
+                          <a:solidFill>
+                            <a:srgbClr val="ffffff"/>
+                          </a:solidFill>
+                        </a:uFill>
+                        <a:latin typeface="Arial"/>
+                      </a:endParaRPr>
+                    </a:p>
+                  </a:txBody>
+                  <a:tcPr marL="90000" marR="90000">
+                    <a:lnL w="720">
+                      <a:solidFill>
+                        <a:srgbClr val="ffffff"/>
+                      </a:solidFill>
+                    </a:lnL>
+                    <a:lnR w="720">
+                      <a:solidFill>
+                        <a:srgbClr val="ffffff"/>
+                      </a:solidFill>
+                    </a:lnR>
+                    <a:lnT w="720">
+                      <a:solidFill>
+                        <a:srgbClr val="ffffff"/>
+                      </a:solidFill>
+                    </a:lnT>
+                    <a:lnB w="720">
+                      <a:solidFill>
+                        <a:srgbClr val="ffffff"/>
+                      </a:solidFill>
+                    </a:lnB>
+                    <a:solidFill>
+                      <a:srgbClr val="cccccc"/>
+                    </a:solidFill>
+                  </a:tcPr>
+                </a:tc>
+                <a:tc>
+                  <a:txBody>
+                    <a:bodyPr lIns="90000" rIns="90000" tIns="46800" bIns="46800"/>
+                    <a:p>
+                      <a:pPr algn="ctr"/>
+                      <a:r>
+                        <a:rPr b="0" lang="en-US" sz="1400" spc="-1" strike="noStrike">
+                          <a:solidFill>
+                            <a:srgbClr val="000000"/>
+                          </a:solidFill>
+                          <a:uFill>
+                            <a:solidFill>
+                              <a:srgbClr val="ffffff"/>
+                            </a:solidFill>
+                          </a:uFill>
+                          <a:latin typeface="Arial"/>
+                        </a:rPr>
+                        <a:t>12.078</a:t>
+                      </a:r>
+                      <a:endParaRPr b="0" lang="en-US" sz="1800" spc="-1" strike="noStrike">
+                        <a:solidFill>
+                          <a:srgbClr val="000000"/>
+                        </a:solidFill>
+                        <a:uFill>
+                          <a:solidFill>
+                            <a:srgbClr val="ffffff"/>
+                          </a:solidFill>
+                        </a:uFill>
+                        <a:latin typeface="Arial"/>
+                      </a:endParaRPr>
+                    </a:p>
+                  </a:txBody>
+                  <a:tcPr marL="90000" marR="90000">
+                    <a:lnL w="720">
+                      <a:solidFill>
+                        <a:srgbClr val="ffffff"/>
+                      </a:solidFill>
+                    </a:lnL>
+                    <a:lnR w="720">
+                      <a:solidFill>
+                        <a:srgbClr val="ffffff"/>
+                      </a:solidFill>
+                    </a:lnR>
+                    <a:lnT w="720">
+                      <a:solidFill>
+                        <a:srgbClr val="ffffff"/>
+                      </a:solidFill>
+                    </a:lnT>
+                    <a:lnB w="720">
+                      <a:solidFill>
+                        <a:srgbClr val="ffffff"/>
+                      </a:solidFill>
+                    </a:lnB>
+                    <a:solidFill>
+                      <a:srgbClr val="cccccc"/>
+                    </a:solidFill>
+                  </a:tcPr>
+                </a:tc>
+                <a:tc>
+                  <a:txBody>
+                    <a:bodyPr lIns="90000" rIns="90000" tIns="46800" bIns="46800"/>
+                    <a:p>
+                      <a:pPr algn="ctr"/>
+                      <a:r>
+                        <a:rPr b="0" lang="en-US" sz="1400" spc="-1" strike="noStrike">
+                          <a:solidFill>
+                            <a:srgbClr val="000000"/>
+                          </a:solidFill>
+                          <a:uFill>
+                            <a:solidFill>
+                              <a:srgbClr val="ffffff"/>
+                            </a:solidFill>
+                          </a:uFill>
+                          <a:latin typeface="Arial"/>
+                        </a:rPr>
+                        <a:t>11.485</a:t>
+                      </a:r>
+                      <a:endParaRPr b="0" lang="en-US" sz="1800" spc="-1" strike="noStrike">
+                        <a:solidFill>
+                          <a:srgbClr val="000000"/>
+                        </a:solidFill>
+                        <a:uFill>
+                          <a:solidFill>
+                            <a:srgbClr val="ffffff"/>
+                          </a:solidFill>
+                        </a:uFill>
+                        <a:latin typeface="Arial"/>
+                      </a:endParaRPr>
+                    </a:p>
+                  </a:txBody>
+                  <a:tcPr marL="90000" marR="90000">
+                    <a:lnL w="720">
+                      <a:solidFill>
+                        <a:srgbClr val="ffffff"/>
+                      </a:solidFill>
+                    </a:lnL>
+                    <a:lnR w="720">
+                      <a:solidFill>
+                        <a:srgbClr val="ffffff"/>
+                      </a:solidFill>
+                    </a:lnR>
+                    <a:lnT w="720">
+                      <a:solidFill>
+                        <a:srgbClr val="ffffff"/>
+                      </a:solidFill>
+                    </a:lnT>
+                    <a:lnB w="720">
+                      <a:solidFill>
+                        <a:srgbClr val="ffffff"/>
+                      </a:solidFill>
+                    </a:lnB>
+                    <a:solidFill>
+                      <a:srgbClr val="cccccc"/>
+                    </a:solidFill>
+                  </a:tcPr>
+                </a:tc>
+                <a:tc>
+                  <a:txBody>
+                    <a:bodyPr lIns="90000" rIns="90000" tIns="46800" bIns="46800"/>
+                    <a:p>
+                      <a:pPr algn="ctr"/>
+                      <a:r>
+                        <a:rPr b="0" lang="en-US" sz="1400" spc="-1" strike="noStrike">
+                          <a:solidFill>
+                            <a:srgbClr val="000000"/>
+                          </a:solidFill>
+                          <a:uFill>
+                            <a:solidFill>
+                              <a:srgbClr val="ffffff"/>
+                            </a:solidFill>
+                          </a:uFill>
+                          <a:latin typeface="Arial"/>
+                        </a:rPr>
+                        <a:t>14.336</a:t>
+                      </a:r>
+                      <a:endParaRPr b="0" lang="en-US" sz="1800" spc="-1" strike="noStrike">
+                        <a:solidFill>
+                          <a:srgbClr val="000000"/>
+                        </a:solidFill>
+                        <a:uFill>
+                          <a:solidFill>
+                            <a:srgbClr val="ffffff"/>
+                          </a:solidFill>
+                        </a:uFill>
+                        <a:latin typeface="Arial"/>
+                      </a:endParaRPr>
+                    </a:p>
+                  </a:txBody>
+                  <a:tcPr marL="90000" marR="90000">
+                    <a:lnL w="720">
+                      <a:solidFill>
+                        <a:srgbClr val="ffffff"/>
+                      </a:solidFill>
+                    </a:lnL>
+                    <a:lnR w="720">
+                      <a:solidFill>
+                        <a:srgbClr val="ffffff"/>
+                      </a:solidFill>
+                    </a:lnR>
+                    <a:lnT w="720">
+                      <a:solidFill>
+                        <a:srgbClr val="ffffff"/>
+                      </a:solidFill>
+                    </a:lnT>
+                    <a:lnB w="720">
+                      <a:solidFill>
+                        <a:srgbClr val="ffffff"/>
+                      </a:solidFill>
+                    </a:lnB>
+                    <a:solidFill>
+                      <a:srgbClr val="cccccc"/>
+                    </a:solidFill>
+                  </a:tcPr>
+                </a:tc>
+                <a:tc>
+                  <a:txBody>
+                    <a:bodyPr lIns="90000" rIns="90000" tIns="46800" bIns="46800"/>
+                    <a:p>
+                      <a:pPr algn="ctr"/>
+                      <a:r>
+                        <a:rPr b="0" lang="en-US" sz="1400" spc="-1" strike="noStrike">
+                          <a:solidFill>
+                            <a:srgbClr val="000000"/>
+                          </a:solidFill>
+                          <a:uFill>
+                            <a:solidFill>
+                              <a:srgbClr val="ffffff"/>
+                            </a:solidFill>
+                          </a:uFill>
+                          <a:latin typeface="Arial"/>
+                        </a:rPr>
+                        <a:t>24.584</a:t>
+                      </a:r>
+                      <a:endParaRPr b="0" lang="en-US" sz="1800" spc="-1" strike="noStrike">
+                        <a:solidFill>
+                          <a:srgbClr val="000000"/>
+                        </a:solidFill>
+                        <a:uFill>
+                          <a:solidFill>
+                            <a:srgbClr val="ffffff"/>
+                          </a:solidFill>
+                        </a:uFill>
+                        <a:latin typeface="Arial"/>
+                      </a:endParaRPr>
+                    </a:p>
+                  </a:txBody>
+                  <a:tcPr marL="90000" marR="90000">
+                    <a:lnL w="720">
+                      <a:solidFill>
+                        <a:srgbClr val="ffffff"/>
+                      </a:solidFill>
+                    </a:lnL>
+                    <a:lnR w="720">
+                      <a:solidFill>
+                        <a:srgbClr val="ffffff"/>
+                      </a:solidFill>
+                    </a:lnR>
+                    <a:lnT w="720">
+                      <a:solidFill>
+                        <a:srgbClr val="ffffff"/>
+                      </a:solidFill>
+                    </a:lnT>
+                    <a:lnB w="720">
+                      <a:solidFill>
+                        <a:srgbClr val="ffffff"/>
+                      </a:solidFill>
+                    </a:lnB>
+                    <a:solidFill>
+                      <a:srgbClr val="cccccc"/>
+                    </a:solidFill>
+                  </a:tcPr>
+                </a:tc>
+                <a:tc>
+                  <a:txBody>
+                    <a:bodyPr lIns="90000" rIns="90000" tIns="46800" bIns="46800"/>
+                    <a:p>
+                      <a:pPr algn="ctr"/>
+                      <a:r>
+                        <a:rPr b="0" lang="en-US" sz="1400" spc="-1" strike="noStrike">
+                          <a:solidFill>
+                            <a:srgbClr val="000000"/>
+                          </a:solidFill>
+                          <a:uFill>
+                            <a:solidFill>
+                              <a:srgbClr val="ffffff"/>
+                            </a:solidFill>
+                          </a:uFill>
+                          <a:latin typeface="Arial"/>
+                        </a:rPr>
+                        <a:t>26.250</a:t>
+                      </a:r>
+                      <a:endParaRPr b="0" lang="en-US" sz="1800" spc="-1" strike="noStrike">
+                        <a:solidFill>
+                          <a:srgbClr val="000000"/>
+                        </a:solidFill>
+                        <a:uFill>
+                          <a:solidFill>
+                            <a:srgbClr val="ffffff"/>
+                          </a:solidFill>
+                        </a:uFill>
+                        <a:latin typeface="Arial"/>
+                      </a:endParaRPr>
+                    </a:p>
+                  </a:txBody>
+                  <a:tcPr marL="90000" marR="90000">
+                    <a:lnL w="720">
+                      <a:solidFill>
+                        <a:srgbClr val="ffffff"/>
+                      </a:solidFill>
+                    </a:lnL>
+                    <a:lnR w="720">
+                      <a:solidFill>
+                        <a:srgbClr val="ffffff"/>
+                      </a:solidFill>
+                    </a:lnR>
+                    <a:lnT w="720">
+                      <a:solidFill>
+                        <a:srgbClr val="ffffff"/>
+                      </a:solidFill>
+                    </a:lnT>
+                    <a:lnB w="720">
+                      <a:solidFill>
+                        <a:srgbClr val="ffffff"/>
+                      </a:solidFill>
+                    </a:lnB>
+                    <a:solidFill>
+                      <a:srgbClr val="cccccc"/>
+                    </a:solidFill>
+                  </a:tcPr>
+                </a:tc>
+                <a:tc>
+                  <a:txBody>
+                    <a:bodyPr lIns="90000" rIns="90000" tIns="46800" bIns="46800"/>
+                    <a:p>
+                      <a:pPr algn="ctr"/>
+                      <a:r>
+                        <a:rPr b="0" lang="en-US" sz="1400" spc="-1" strike="noStrike">
+                          <a:solidFill>
+                            <a:srgbClr val="000000"/>
+                          </a:solidFill>
+                          <a:uFill>
+                            <a:solidFill>
+                              <a:srgbClr val="ffffff"/>
+                            </a:solidFill>
+                          </a:uFill>
+                          <a:latin typeface="Arial"/>
+                        </a:rPr>
+                        <a:t>25.607</a:t>
+                      </a:r>
+                      <a:endParaRPr b="0" lang="en-US" sz="1800" spc="-1" strike="noStrike">
+                        <a:solidFill>
+                          <a:srgbClr val="000000"/>
+                        </a:solidFill>
+                        <a:uFill>
+                          <a:solidFill>
+                            <a:srgbClr val="ffffff"/>
+                          </a:solidFill>
+                        </a:uFill>
+                        <a:latin typeface="Arial"/>
+                      </a:endParaRPr>
+                    </a:p>
+                  </a:txBody>
+                  <a:tcPr marL="90000" marR="90000">
+                    <a:lnL w="720">
+                      <a:solidFill>
+                        <a:srgbClr val="ffffff"/>
+                      </a:solidFill>
+                    </a:lnL>
+                    <a:lnR w="720">
+                      <a:solidFill>
+                        <a:srgbClr val="ffffff"/>
+                      </a:solidFill>
+                    </a:lnR>
+                    <a:lnT w="720">
+                      <a:solidFill>
+                        <a:srgbClr val="ffffff"/>
+                      </a:solidFill>
+                    </a:lnT>
+                    <a:lnB w="720">
+                      <a:solidFill>
+                        <a:srgbClr val="ffffff"/>
+                      </a:solidFill>
+                    </a:lnB>
+                    <a:solidFill>
+                      <a:srgbClr val="cccccc"/>
+                    </a:solidFill>
+                  </a:tcPr>
+                </a:tc>
+              </a:tr>
+              <a:tr h="505800">
+                <a:tc>
+                  <a:txBody>
+                    <a:bodyPr lIns="90000" rIns="90000" tIns="46800" bIns="46800"/>
+                    <a:p>
+                      <a:pPr algn="ctr"/>
+                      <a:r>
+                        <a:rPr b="0" lang="en-US" sz="1400" spc="-1" strike="noStrike">
+                          <a:solidFill>
+                            <a:srgbClr val="000000"/>
+                          </a:solidFill>
+                          <a:uFill>
+                            <a:solidFill>
+                              <a:srgbClr val="ffffff"/>
+                            </a:solidFill>
+                          </a:uFill>
+                          <a:latin typeface="Arial"/>
+                        </a:rPr>
+                        <a:t>Stop Sign</a:t>
+                      </a:r>
+                      <a:endParaRPr b="0" lang="en-US" sz="1800" spc="-1" strike="noStrike">
+                        <a:solidFill>
+                          <a:srgbClr val="000000"/>
+                        </a:solidFill>
+                        <a:uFill>
+                          <a:solidFill>
+                            <a:srgbClr val="ffffff"/>
+                          </a:solidFill>
+                        </a:uFill>
+                        <a:latin typeface="Arial"/>
+                      </a:endParaRPr>
+                    </a:p>
+                  </a:txBody>
+                  <a:tcPr marL="90000" marR="90000">
+                    <a:lnL w="720">
+                      <a:solidFill>
+                        <a:srgbClr val="ffffff"/>
+                      </a:solidFill>
+                    </a:lnL>
+                    <a:lnR w="720">
+                      <a:solidFill>
+                        <a:srgbClr val="ffffff"/>
+                      </a:solidFill>
+                    </a:lnR>
+                    <a:lnT w="720">
+                      <a:solidFill>
+                        <a:srgbClr val="ffffff"/>
+                      </a:solidFill>
+                    </a:lnT>
+                    <a:lnB w="720">
+                      <a:solidFill>
+                        <a:srgbClr val="ffffff"/>
+                      </a:solidFill>
+                    </a:lnB>
+                    <a:solidFill>
+                      <a:srgbClr val="e6e6e6"/>
+                    </a:solidFill>
+                  </a:tcPr>
+                </a:tc>
+                <a:tc>
+                  <a:txBody>
+                    <a:bodyPr lIns="90000" rIns="90000" tIns="46800" bIns="46800"/>
+                    <a:p>
+                      <a:pPr algn="ctr"/>
+                      <a:r>
+                        <a:rPr b="0" lang="en-US" sz="1400" spc="-1" strike="noStrike">
+                          <a:solidFill>
+                            <a:srgbClr val="000000"/>
+                          </a:solidFill>
+                          <a:uFill>
+                            <a:solidFill>
+                              <a:srgbClr val="ffffff"/>
+                            </a:solidFill>
+                          </a:uFill>
+                          <a:latin typeface="Arial"/>
+                        </a:rPr>
+                        <a:t>10.610</a:t>
+                      </a:r>
+                      <a:endParaRPr b="0" lang="en-US" sz="1800" spc="-1" strike="noStrike">
+                        <a:solidFill>
+                          <a:srgbClr val="000000"/>
+                        </a:solidFill>
+                        <a:uFill>
+                          <a:solidFill>
+                            <a:srgbClr val="ffffff"/>
+                          </a:solidFill>
+                        </a:uFill>
+                        <a:latin typeface="Arial"/>
+                      </a:endParaRPr>
+                    </a:p>
+                  </a:txBody>
+                  <a:tcPr marL="90000" marR="90000">
+                    <a:lnL w="720">
+                      <a:solidFill>
+                        <a:srgbClr val="ffffff"/>
+                      </a:solidFill>
+                    </a:lnL>
+                    <a:lnR w="720">
+                      <a:solidFill>
+                        <a:srgbClr val="ffffff"/>
+                      </a:solidFill>
+                    </a:lnR>
+                    <a:lnT w="720">
+                      <a:solidFill>
+                        <a:srgbClr val="ffffff"/>
+                      </a:solidFill>
+                    </a:lnT>
+                    <a:lnB w="720">
+                      <a:solidFill>
+                        <a:srgbClr val="ffffff"/>
+                      </a:solidFill>
+                    </a:lnB>
+                    <a:solidFill>
+                      <a:srgbClr val="e6e6e6"/>
+                    </a:solidFill>
+                  </a:tcPr>
+                </a:tc>
+                <a:tc>
+                  <a:txBody>
+                    <a:bodyPr lIns="90000" rIns="90000" tIns="46800" bIns="46800"/>
+                    <a:p>
+                      <a:pPr algn="ctr"/>
+                      <a:r>
+                        <a:rPr b="0" lang="en-US" sz="1400" spc="-1" strike="noStrike">
+                          <a:solidFill>
+                            <a:srgbClr val="000000"/>
+                          </a:solidFill>
+                          <a:uFill>
+                            <a:solidFill>
+                              <a:srgbClr val="ffffff"/>
+                            </a:solidFill>
+                          </a:uFill>
+                          <a:latin typeface="Arial"/>
+                        </a:rPr>
+                        <a:t>12.849</a:t>
+                      </a:r>
+                      <a:endParaRPr b="0" lang="en-US" sz="1800" spc="-1" strike="noStrike">
+                        <a:solidFill>
+                          <a:srgbClr val="000000"/>
+                        </a:solidFill>
+                        <a:uFill>
+                          <a:solidFill>
+                            <a:srgbClr val="ffffff"/>
+                          </a:solidFill>
+                        </a:uFill>
+                        <a:latin typeface="Arial"/>
+                      </a:endParaRPr>
+                    </a:p>
+                  </a:txBody>
+                  <a:tcPr marL="90000" marR="90000">
+                    <a:lnL w="720">
+                      <a:solidFill>
+                        <a:srgbClr val="ffffff"/>
+                      </a:solidFill>
+                    </a:lnL>
+                    <a:lnR w="720">
+                      <a:solidFill>
+                        <a:srgbClr val="ffffff"/>
+                      </a:solidFill>
+                    </a:lnR>
+                    <a:lnT w="720">
+                      <a:solidFill>
+                        <a:srgbClr val="ffffff"/>
+                      </a:solidFill>
+                    </a:lnT>
+                    <a:lnB w="720">
+                      <a:solidFill>
+                        <a:srgbClr val="ffffff"/>
+                      </a:solidFill>
+                    </a:lnB>
+                    <a:solidFill>
+                      <a:srgbClr val="e6e6e6"/>
+                    </a:solidFill>
+                  </a:tcPr>
+                </a:tc>
+                <a:tc>
+                  <a:txBody>
+                    <a:bodyPr lIns="90000" rIns="90000" tIns="46800" bIns="46800"/>
+                    <a:p>
+                      <a:pPr algn="ctr"/>
+                      <a:r>
+                        <a:rPr b="0" lang="en-US" sz="1400" spc="-1" strike="noStrike">
+                          <a:solidFill>
+                            <a:srgbClr val="000000"/>
+                          </a:solidFill>
+                          <a:uFill>
+                            <a:solidFill>
+                              <a:srgbClr val="ffffff"/>
+                            </a:solidFill>
+                          </a:uFill>
+                          <a:latin typeface="Arial"/>
+                        </a:rPr>
+                        <a:t>15.846</a:t>
+                      </a:r>
+                      <a:endParaRPr b="0" lang="en-US" sz="1800" spc="-1" strike="noStrike">
+                        <a:solidFill>
+                          <a:srgbClr val="000000"/>
+                        </a:solidFill>
+                        <a:uFill>
+                          <a:solidFill>
+                            <a:srgbClr val="ffffff"/>
+                          </a:solidFill>
+                        </a:uFill>
+                        <a:latin typeface="Arial"/>
+                      </a:endParaRPr>
+                    </a:p>
+                  </a:txBody>
+                  <a:tcPr marL="90000" marR="90000">
+                    <a:lnL w="720">
+                      <a:solidFill>
+                        <a:srgbClr val="ffffff"/>
+                      </a:solidFill>
+                    </a:lnL>
+                    <a:lnR w="720">
+                      <a:solidFill>
+                        <a:srgbClr val="ffffff"/>
+                      </a:solidFill>
+                    </a:lnR>
+                    <a:lnT w="720">
+                      <a:solidFill>
+                        <a:srgbClr val="ffffff"/>
+                      </a:solidFill>
+                    </a:lnT>
+                    <a:lnB w="720">
+                      <a:solidFill>
+                        <a:srgbClr val="ffffff"/>
+                      </a:solidFill>
+                    </a:lnB>
+                    <a:solidFill>
+                      <a:srgbClr val="e6e6e6"/>
+                    </a:solidFill>
+                  </a:tcPr>
+                </a:tc>
+                <a:tc>
+                  <a:txBody>
+                    <a:bodyPr lIns="90000" rIns="90000" tIns="46800" bIns="46800"/>
+                    <a:p>
+                      <a:pPr algn="ctr"/>
+                      <a:r>
+                        <a:rPr b="0" lang="en-US" sz="1400" spc="-1" strike="noStrike">
+                          <a:solidFill>
+                            <a:srgbClr val="000000"/>
+                          </a:solidFill>
+                          <a:uFill>
+                            <a:solidFill>
+                              <a:srgbClr val="ffffff"/>
+                            </a:solidFill>
+                          </a:uFill>
+                          <a:latin typeface="Arial"/>
+                        </a:rPr>
+                        <a:t>19.062</a:t>
+                      </a:r>
+                      <a:endParaRPr b="0" lang="en-US" sz="1800" spc="-1" strike="noStrike">
+                        <a:solidFill>
+                          <a:srgbClr val="000000"/>
+                        </a:solidFill>
+                        <a:uFill>
+                          <a:solidFill>
+                            <a:srgbClr val="ffffff"/>
+                          </a:solidFill>
+                        </a:uFill>
+                        <a:latin typeface="Arial"/>
+                      </a:endParaRPr>
+                    </a:p>
+                  </a:txBody>
+                  <a:tcPr marL="90000" marR="90000">
+                    <a:lnL w="720">
+                      <a:solidFill>
+                        <a:srgbClr val="ffffff"/>
+                      </a:solidFill>
+                    </a:lnL>
+                    <a:lnR w="720">
+                      <a:solidFill>
+                        <a:srgbClr val="ffffff"/>
+                      </a:solidFill>
+                    </a:lnR>
+                    <a:lnT w="720">
+                      <a:solidFill>
+                        <a:srgbClr val="ffffff"/>
+                      </a:solidFill>
+                    </a:lnT>
+                    <a:lnB w="720">
+                      <a:solidFill>
+                        <a:srgbClr val="ffffff"/>
+                      </a:solidFill>
+                    </a:lnB>
+                    <a:solidFill>
+                      <a:srgbClr val="e6e6e6"/>
+                    </a:solidFill>
+                  </a:tcPr>
+                </a:tc>
+                <a:tc>
+                  <a:txBody>
+                    <a:bodyPr lIns="90000" rIns="90000" tIns="46800" bIns="46800"/>
+                    <a:p>
+                      <a:pPr algn="ctr"/>
+                      <a:r>
+                        <a:rPr b="0" lang="en-US" sz="1400" spc="-1" strike="noStrike">
+                          <a:solidFill>
+                            <a:srgbClr val="000000"/>
+                          </a:solidFill>
+                          <a:uFill>
+                            <a:solidFill>
+                              <a:srgbClr val="ffffff"/>
+                            </a:solidFill>
+                          </a:uFill>
+                          <a:latin typeface="Arial"/>
+                        </a:rPr>
+                        <a:t>22.582</a:t>
+                      </a:r>
+                      <a:endParaRPr b="0" lang="en-US" sz="1800" spc="-1" strike="noStrike">
+                        <a:solidFill>
+                          <a:srgbClr val="000000"/>
+                        </a:solidFill>
+                        <a:uFill>
+                          <a:solidFill>
+                            <a:srgbClr val="ffffff"/>
+                          </a:solidFill>
+                        </a:uFill>
+                        <a:latin typeface="Arial"/>
+                      </a:endParaRPr>
+                    </a:p>
+                  </a:txBody>
+                  <a:tcPr marL="90000" marR="90000">
+                    <a:lnL w="720">
+                      <a:solidFill>
+                        <a:srgbClr val="ffffff"/>
+                      </a:solidFill>
+                    </a:lnL>
+                    <a:lnR w="720">
+                      <a:solidFill>
+                        <a:srgbClr val="ffffff"/>
+                      </a:solidFill>
+                    </a:lnR>
+                    <a:lnT w="720">
+                      <a:solidFill>
+                        <a:srgbClr val="ffffff"/>
+                      </a:solidFill>
+                    </a:lnT>
+                    <a:lnB w="720">
+                      <a:solidFill>
+                        <a:srgbClr val="ffffff"/>
+                      </a:solidFill>
+                    </a:lnB>
+                    <a:solidFill>
+                      <a:srgbClr val="e6e6e6"/>
+                    </a:solidFill>
+                  </a:tcPr>
+                </a:tc>
+                <a:tc>
+                  <a:txBody>
+                    <a:bodyPr lIns="90000" rIns="90000" tIns="46800" bIns="46800"/>
+                    <a:p>
+                      <a:pPr algn="ctr"/>
+                      <a:r>
+                        <a:rPr b="0" lang="en-US" sz="1400" spc="-1" strike="noStrike">
+                          <a:solidFill>
+                            <a:srgbClr val="000000"/>
+                          </a:solidFill>
+                          <a:uFill>
+                            <a:solidFill>
+                              <a:srgbClr val="ffffff"/>
+                            </a:solidFill>
+                          </a:uFill>
+                          <a:latin typeface="Arial"/>
+                        </a:rPr>
+                        <a:t>23.050</a:t>
+                      </a:r>
+                      <a:endParaRPr b="0" lang="en-US" sz="1800" spc="-1" strike="noStrike">
+                        <a:solidFill>
+                          <a:srgbClr val="000000"/>
+                        </a:solidFill>
+                        <a:uFill>
+                          <a:solidFill>
+                            <a:srgbClr val="ffffff"/>
+                          </a:solidFill>
+                        </a:uFill>
+                        <a:latin typeface="Arial"/>
+                      </a:endParaRPr>
+                    </a:p>
+                  </a:txBody>
+                  <a:tcPr marL="90000" marR="90000">
+                    <a:lnL w="720">
+                      <a:solidFill>
+                        <a:srgbClr val="ffffff"/>
+                      </a:solidFill>
+                    </a:lnL>
+                    <a:lnR w="720">
+                      <a:solidFill>
+                        <a:srgbClr val="ffffff"/>
+                      </a:solidFill>
+                    </a:lnR>
+                    <a:lnT w="720">
+                      <a:solidFill>
+                        <a:srgbClr val="ffffff"/>
+                      </a:solidFill>
+                    </a:lnT>
+                    <a:lnB w="720">
+                      <a:solidFill>
+                        <a:srgbClr val="ffffff"/>
+                      </a:solidFill>
+                    </a:lnB>
+                    <a:solidFill>
+                      <a:srgbClr val="e6e6e6"/>
+                    </a:solidFill>
+                  </a:tcPr>
+                </a:tc>
+              </a:tr>
+            </a:tbl>
+          </a:graphicData>
+        </a:graphic>
+      </p:graphicFrame>
     </p:spTree>
   </p:cSld>
-  <p:timing>
-    <p:tnLst>
-      <p:par>
-        <p:cTn id="15" dur="indefinite" restart="never" nodeType="tmRoot">
-          <p:childTnLst>
-            <p:seq>
-              <p:cTn id="16" nodeType="mainSeq"/>
-              <p:prevCondLst>
-                <p:cond delay="0" evt="onPrev">
-                  <p:tgtEl>
-                    <p:sldTgt/>
-                  </p:tgtEl>
-                </p:cond>
-              </p:prevCondLst>
-              <p:nextCondLst>
-                <p:cond delay="0" evt="onNext">
-                  <p:tgtEl>
-                    <p:sldTgt/>
-                  </p:tgtEl>
-                </p:cond>
-              </p:nextCondLst>
-            </p:seq>
-          </p:childTnLst>
-        </p:cTn>
-      </p:par>
-    </p:tnLst>
-  </p:timing>
 </p:sld>
 </file>
 
@@ -9349,14 +11825,14 @@
       </p:grpSpPr>
       <p:sp>
         <p:nvSpPr>
-          <p:cNvPr id="158" name="TextShape 1"/>
-          <p:cNvSpPr txBox="1"/>
+          <p:cNvPr id="159" name="CustomShape 1"/>
+          <p:cNvSpPr/>
           <p:nvPr/>
         </p:nvSpPr>
         <p:spPr>
           <a:xfrm>
-            <a:off x="838080" y="365040"/>
-            <a:ext cx="10514520" cy="1324440"/>
+            <a:off x="838080" y="48960"/>
+            <a:ext cx="10514520" cy="1956960"/>
           </a:xfrm>
           <a:prstGeom prst="rect">
             <a:avLst/>
@@ -9366,10 +11842,15 @@
             <a:noFill/>
           </a:ln>
         </p:spPr>
+        <p:style>
+          <a:lnRef idx="0"/>
+          <a:fillRef idx="0"/>
+          <a:effectRef idx="0"/>
+          <a:fontRef idx="minor"/>
+        </p:style>
         <p:txBody>
           <a:bodyPr lIns="0" rIns="0" tIns="0" bIns="0" anchor="ctr"/>
           <a:p>
-            <a:pPr algn="ctr"/>
             <a:r>
               <a:rPr b="0" lang="en-US" sz="4400" spc="-1" strike="noStrike">
                 <a:solidFill>
@@ -9383,22 +11864,71 @@
                 <a:latin typeface="Andalus"/>
                 <a:ea typeface="DejaVu Sans"/>
               </a:rPr>
-              <a:t>Extra Video with Teslas (Not Accurate)</a:t>
+              <a:t>Results</a:t>
             </a:r>
-            <a:endParaRPr b="0" lang="en-US" sz="4400" spc="-1" strike="noStrike">
-              <a:solidFill>
-                <a:srgbClr val="000000"/>
-              </a:solidFill>
-              <a:uFill>
-                <a:solidFill>
-                  <a:srgbClr val="ffffff"/>
-                </a:solidFill>
-              </a:uFill>
-              <a:latin typeface="Arial"/>
-            </a:endParaRPr>
-          </a:p>
-        </p:txBody>
-      </p:sp>
+            <a:endParaRPr b="0" lang="en-US" sz="1800" spc="-1" strike="noStrike">
+              <a:solidFill>
+                <a:srgbClr val="000000"/>
+              </a:solidFill>
+              <a:uFill>
+                <a:solidFill>
+                  <a:srgbClr val="ffffff"/>
+                </a:solidFill>
+              </a:uFill>
+              <a:latin typeface="Arial"/>
+            </a:endParaRPr>
+          </a:p>
+        </p:txBody>
+      </p:sp>
+      <p:sp>
+        <p:nvSpPr>
+          <p:cNvPr id="160" name="CustomShape 2"/>
+          <p:cNvSpPr/>
+          <p:nvPr/>
+        </p:nvSpPr>
+        <p:spPr>
+          <a:xfrm>
+            <a:off x="640440" y="2057760"/>
+            <a:ext cx="10972080" cy="3976920"/>
+          </a:xfrm>
+          <a:prstGeom prst="rect">
+            <a:avLst/>
+          </a:prstGeom>
+          <a:noFill/>
+          <a:ln>
+            <a:noFill/>
+          </a:ln>
+        </p:spPr>
+        <p:style>
+          <a:lnRef idx="0"/>
+          <a:fillRef idx="0"/>
+          <a:effectRef idx="0"/>
+          <a:fontRef idx="minor"/>
+        </p:style>
+      </p:sp>
+      <p:pic>
+        <p:nvPicPr>
+          <p:cNvPr id="161" name="" descr=""/>
+          <p:cNvPicPr/>
+          <p:nvPr/>
+        </p:nvPicPr>
+        <p:blipFill>
+          <a:blip r:embed="rId1"/>
+          <a:stretch/>
+        </p:blipFill>
+        <p:spPr>
+          <a:xfrm>
+            <a:off x="2270520" y="1487160"/>
+            <a:ext cx="7219440" cy="4819320"/>
+          </a:xfrm>
+          <a:prstGeom prst="rect">
+            <a:avLst/>
+          </a:prstGeom>
+          <a:ln>
+            <a:noFill/>
+          </a:ln>
+        </p:spPr>
+      </p:pic>
     </p:spTree>
   </p:cSld>
 </p:sld>

</xml_diff>